<commit_message>
add image in poster
</commit_message>
<xml_diff>
--- a/poster/poster.pptx
+++ b/poster/poster.pptx
@@ -2,7 +2,7 @@
 <file path=ppt/presentation.xml><?xml version="1.0" encoding="utf-8"?>
 <p:presentation xmlns:a="http://schemas.openxmlformats.org/drawingml/2006/main" xmlns:r="http://schemas.openxmlformats.org/officeDocument/2006/relationships" xmlns:p="http://schemas.openxmlformats.org/presentationml/2006/main" saveSubsetFonts="1" autoCompressPictures="0">
   <p:sldMasterIdLst>
-    <p:sldMasterId id="2147483660" r:id="rId1"/>
+    <p:sldMasterId id="2147483672" r:id="rId1"/>
   </p:sldMasterIdLst>
   <p:notesMasterIdLst>
     <p:notesMasterId r:id="rId3"/>
@@ -107,6 +107,11 @@
       </a:defRPr>
     </a:lvl9pPr>
   </p:defaultTextStyle>
+  <p:extLst>
+    <p:ext uri="{EFAFB233-063F-42B5-8137-9DF3F51BA10A}">
+      <p15:sldGuideLst xmlns:p15="http://schemas.microsoft.com/office/powerpoint/2012/main"/>
+    </p:ext>
+  </p:extLst>
 </p:presentation>
 </file>
 
@@ -192,7 +197,7 @@
           <a:p>
             <a:fld id="{82A4F5B2-628C-AD47-AC61-4B2157D02BF7}" type="datetimeFigureOut">
               <a:rPr lang="en-US" smtClean="0"/>
-              <a:t>4/20/16</a:t>
+              <a:t>4/21/2016</a:t>
             </a:fld>
             <a:endParaRPr lang="en-US"/>
           </a:p>
@@ -545,7 +550,7 @@
 </file>
 
 <file path=ppt/slideLayouts/slideLayout1.xml><?xml version="1.0" encoding="utf-8"?>
-<p:sldLayout xmlns:a="http://schemas.openxmlformats.org/drawingml/2006/main" xmlns:r="http://schemas.openxmlformats.org/officeDocument/2006/relationships" xmlns:p="http://schemas.openxmlformats.org/presentationml/2006/main" type="title" preserve="1">
+<p:sldLayout xmlns:a="http://schemas.openxmlformats.org/drawingml/2006/main" xmlns:r="http://schemas.openxmlformats.org/officeDocument/2006/relationships" xmlns:p="http://schemas.openxmlformats.org/presentationml/2006/main" showMasterSp="0" type="title" preserve="1">
   <p:cSld name="Title Slide">
     <p:spTree>
       <p:nvGrpSpPr>
@@ -563,6 +568,82 @@
       </p:grpSpPr>
       <p:sp>
         <p:nvSpPr>
+          <p:cNvPr id="7" name="Rectangle 6"/>
+          <p:cNvSpPr/>
+          <p:nvPr/>
+        </p:nvSpPr>
+        <p:spPr>
+          <a:xfrm>
+            <a:off x="4765" y="25603200"/>
+            <a:ext cx="18283238" cy="1828800"/>
+          </a:xfrm>
+          <a:prstGeom prst="rect">
+            <a:avLst/>
+          </a:prstGeom>
+          <a:solidFill>
+            <a:schemeClr val="accent2"/>
+          </a:solidFill>
+          <a:ln>
+            <a:noFill/>
+          </a:ln>
+        </p:spPr>
+        <p:style>
+          <a:lnRef idx="2">
+            <a:schemeClr val="accent1">
+              <a:shade val="50000"/>
+            </a:schemeClr>
+          </a:lnRef>
+          <a:fillRef idx="1">
+            <a:schemeClr val="accent1"/>
+          </a:fillRef>
+          <a:effectRef idx="0">
+            <a:schemeClr val="accent1"/>
+          </a:effectRef>
+          <a:fontRef idx="minor">
+            <a:schemeClr val="lt1"/>
+          </a:fontRef>
+        </p:style>
+      </p:sp>
+      <p:sp>
+        <p:nvSpPr>
+          <p:cNvPr id="8" name="Rectangle 7"/>
+          <p:cNvSpPr/>
+          <p:nvPr/>
+        </p:nvSpPr>
+        <p:spPr>
+          <a:xfrm>
+            <a:off x="25" y="25337264"/>
+            <a:ext cx="18283238" cy="256032"/>
+          </a:xfrm>
+          <a:prstGeom prst="rect">
+            <a:avLst/>
+          </a:prstGeom>
+          <a:solidFill>
+            <a:schemeClr val="accent1"/>
+          </a:solidFill>
+          <a:ln>
+            <a:noFill/>
+          </a:ln>
+        </p:spPr>
+        <p:style>
+          <a:lnRef idx="2">
+            <a:schemeClr val="accent1">
+              <a:shade val="50000"/>
+            </a:schemeClr>
+          </a:lnRef>
+          <a:fillRef idx="1">
+            <a:schemeClr val="accent1"/>
+          </a:fillRef>
+          <a:effectRef idx="0">
+            <a:schemeClr val="accent1"/>
+          </a:effectRef>
+          <a:fontRef idx="minor">
+            <a:schemeClr val="lt1"/>
+          </a:fontRef>
+        </p:style>
+      </p:sp>
+      <p:sp>
+        <p:nvSpPr>
           <p:cNvPr id="2" name="Title 1"/>
           <p:cNvSpPr>
             <a:spLocks noGrp="1"/>
@@ -573,15 +654,27 @@
         </p:nvSpPr>
         <p:spPr>
           <a:xfrm>
-            <a:off x="1371600" y="4489452"/>
-            <a:ext cx="15544800" cy="9550400"/>
-          </a:xfrm>
-        </p:spPr>
-        <p:txBody>
-          <a:bodyPr anchor="b"/>
+            <a:off x="1645920" y="3035808"/>
+            <a:ext cx="15087600" cy="14264640"/>
+          </a:xfrm>
+        </p:spPr>
+        <p:txBody>
+          <a:bodyPr anchor="b">
+            <a:normAutofit/>
+          </a:bodyPr>
           <a:lstStyle>
-            <a:lvl1pPr algn="ctr">
-              <a:defRPr sz="12000"/>
+            <a:lvl1pPr algn="l">
+              <a:lnSpc>
+                <a:spcPct val="85000"/>
+              </a:lnSpc>
+              <a:defRPr sz="16000" spc="-100" baseline="0">
+                <a:solidFill>
+                  <a:schemeClr val="tx1">
+                    <a:lumMod val="85000"/>
+                    <a:lumOff val="15000"/>
+                  </a:schemeClr>
+                </a:solidFill>
+              </a:defRPr>
             </a:lvl1pPr>
           </a:lstStyle>
           <a:p>
@@ -605,48 +698,55 @@
         </p:nvSpPr>
         <p:spPr>
           <a:xfrm>
-            <a:off x="2286000" y="14408152"/>
-            <a:ext cx="13716000" cy="6623048"/>
-          </a:xfrm>
-        </p:spPr>
-        <p:txBody>
-          <a:bodyPr/>
+            <a:off x="1650076" y="17822484"/>
+            <a:ext cx="15087600" cy="4572000"/>
+          </a:xfrm>
+        </p:spPr>
+        <p:txBody>
+          <a:bodyPr lIns="91440" rIns="91440">
+            <a:normAutofit/>
+          </a:bodyPr>
           <a:lstStyle>
-            <a:lvl1pPr marL="0" indent="0" algn="ctr">
-              <a:buNone/>
-              <a:defRPr sz="4800"/>
+            <a:lvl1pPr marL="0" indent="0" algn="l">
+              <a:buNone/>
+              <a:defRPr sz="4800" cap="all" spc="400" baseline="0">
+                <a:solidFill>
+                  <a:schemeClr val="tx2"/>
+                </a:solidFill>
+                <a:latin typeface="+mj-lt"/>
+              </a:defRPr>
             </a:lvl1pPr>
             <a:lvl2pPr marL="914400" indent="0" algn="ctr">
               <a:buNone/>
-              <a:defRPr sz="4000"/>
+              <a:defRPr sz="4800"/>
             </a:lvl2pPr>
             <a:lvl3pPr marL="1828800" indent="0" algn="ctr">
               <a:buNone/>
-              <a:defRPr sz="3600"/>
+              <a:defRPr sz="4800"/>
             </a:lvl3pPr>
             <a:lvl4pPr marL="2743200" indent="0" algn="ctr">
               <a:buNone/>
-              <a:defRPr sz="3200"/>
+              <a:defRPr sz="4000"/>
             </a:lvl4pPr>
             <a:lvl5pPr marL="3657600" indent="0" algn="ctr">
               <a:buNone/>
-              <a:defRPr sz="3200"/>
+              <a:defRPr sz="4000"/>
             </a:lvl5pPr>
             <a:lvl6pPr marL="4572000" indent="0" algn="ctr">
               <a:buNone/>
-              <a:defRPr sz="3200"/>
+              <a:defRPr sz="4000"/>
             </a:lvl6pPr>
             <a:lvl7pPr marL="5486400" indent="0" algn="ctr">
               <a:buNone/>
-              <a:defRPr sz="3200"/>
+              <a:defRPr sz="4000"/>
             </a:lvl7pPr>
             <a:lvl8pPr marL="6400800" indent="0" algn="ctr">
               <a:buNone/>
-              <a:defRPr sz="3200"/>
+              <a:defRPr sz="4000"/>
             </a:lvl8pPr>
             <a:lvl9pPr marL="7315200" indent="0" algn="ctr">
               <a:buNone/>
-              <a:defRPr sz="3200"/>
+              <a:defRPr sz="4000"/>
             </a:lvl9pPr>
           </a:lstStyle>
           <a:p>
@@ -675,7 +775,7 @@
           <a:p>
             <a:fld id="{7B1138D3-01E9-BE4F-8B6D-32D27699DBB9}" type="datetimeFigureOut">
               <a:rPr lang="en-US" smtClean="0"/>
-              <a:t>4/20/16</a:t>
+              <a:t>4/21/2016</a:t>
             </a:fld>
             <a:endParaRPr lang="en-US"/>
           </a:p>
@@ -723,10 +823,48 @@
           </a:p>
         </p:txBody>
       </p:sp>
+      <p:cxnSp>
+        <p:nvCxnSpPr>
+          <p:cNvPr id="9" name="Straight Connector 8"/>
+          <p:cNvCxnSpPr/>
+          <p:nvPr/>
+        </p:nvCxnSpPr>
+        <p:spPr>
+          <a:xfrm>
+            <a:off x="1811488" y="17373600"/>
+            <a:ext cx="14813280" cy="0"/>
+          </a:xfrm>
+          <a:prstGeom prst="line">
+            <a:avLst/>
+          </a:prstGeom>
+          <a:ln w="6350">
+            <a:solidFill>
+              <a:schemeClr val="tx1">
+                <a:lumMod val="50000"/>
+                <a:lumOff val="50000"/>
+              </a:schemeClr>
+            </a:solidFill>
+          </a:ln>
+        </p:spPr>
+        <p:style>
+          <a:lnRef idx="1">
+            <a:schemeClr val="accent1"/>
+          </a:lnRef>
+          <a:fillRef idx="0">
+            <a:schemeClr val="accent1"/>
+          </a:fillRef>
+          <a:effectRef idx="0">
+            <a:schemeClr val="accent1"/>
+          </a:effectRef>
+          <a:fontRef idx="minor">
+            <a:schemeClr val="tx1"/>
+          </a:fontRef>
+        </p:style>
+      </p:cxnSp>
     </p:spTree>
     <p:extLst>
       <p:ext uri="{BB962C8B-B14F-4D97-AF65-F5344CB8AC3E}">
-        <p14:creationId xmlns:p14="http://schemas.microsoft.com/office/powerpoint/2010/main" val="2084981284"/>
+        <p14:creationId xmlns:p14="http://schemas.microsoft.com/office/powerpoint/2010/main" val="291558757"/>
       </p:ext>
     </p:extLst>
   </p:cSld>
@@ -788,7 +926,7 @@
         </p:nvSpPr>
         <p:spPr/>
         <p:txBody>
-          <a:bodyPr vert="eaVert"/>
+          <a:bodyPr vert="eaVert" lIns="45720" tIns="0" rIns="45720" bIns="0"/>
           <a:lstStyle/>
           <a:p>
             <a:pPr lvl="0"/>
@@ -845,7 +983,7 @@
           <a:p>
             <a:fld id="{7B1138D3-01E9-BE4F-8B6D-32D27699DBB9}" type="datetimeFigureOut">
               <a:rPr lang="en-US" smtClean="0"/>
-              <a:t>4/20/16</a:t>
+              <a:t>4/21/2016</a:t>
             </a:fld>
             <a:endParaRPr lang="en-US"/>
           </a:p>
@@ -896,7 +1034,7 @@
     </p:spTree>
     <p:extLst>
       <p:ext uri="{BB962C8B-B14F-4D97-AF65-F5344CB8AC3E}">
-        <p14:creationId xmlns:p14="http://schemas.microsoft.com/office/powerpoint/2010/main" val="983128208"/>
+        <p14:creationId xmlns:p14="http://schemas.microsoft.com/office/powerpoint/2010/main" val="2970839832"/>
       </p:ext>
     </p:extLst>
   </p:cSld>
@@ -907,7 +1045,7 @@
 </file>
 
 <file path=ppt/slideLayouts/slideLayout11.xml><?xml version="1.0" encoding="utf-8"?>
-<p:sldLayout xmlns:a="http://schemas.openxmlformats.org/drawingml/2006/main" xmlns:r="http://schemas.openxmlformats.org/officeDocument/2006/relationships" xmlns:p="http://schemas.openxmlformats.org/presentationml/2006/main" type="vertTitleAndTx" preserve="1">
+<p:sldLayout xmlns:a="http://schemas.openxmlformats.org/drawingml/2006/main" xmlns:r="http://schemas.openxmlformats.org/officeDocument/2006/relationships" xmlns:p="http://schemas.openxmlformats.org/presentationml/2006/main" showMasterSp="0" type="vertTitleAndTx" preserve="1">
   <p:cSld name="Vertical Title and Text">
     <p:spTree>
       <p:nvGrpSpPr>
@@ -925,6 +1063,82 @@
       </p:grpSpPr>
       <p:sp>
         <p:nvSpPr>
+          <p:cNvPr id="7" name="Rectangle 6"/>
+          <p:cNvSpPr/>
+          <p:nvPr/>
+        </p:nvSpPr>
+        <p:spPr>
+          <a:xfrm>
+            <a:off x="4765" y="25603200"/>
+            <a:ext cx="18283238" cy="1828800"/>
+          </a:xfrm>
+          <a:prstGeom prst="rect">
+            <a:avLst/>
+          </a:prstGeom>
+          <a:solidFill>
+            <a:schemeClr val="accent2"/>
+          </a:solidFill>
+          <a:ln>
+            <a:noFill/>
+          </a:ln>
+        </p:spPr>
+        <p:style>
+          <a:lnRef idx="2">
+            <a:schemeClr val="accent1">
+              <a:shade val="50000"/>
+            </a:schemeClr>
+          </a:lnRef>
+          <a:fillRef idx="1">
+            <a:schemeClr val="accent1"/>
+          </a:fillRef>
+          <a:effectRef idx="0">
+            <a:schemeClr val="accent1"/>
+          </a:effectRef>
+          <a:fontRef idx="minor">
+            <a:schemeClr val="lt1"/>
+          </a:fontRef>
+        </p:style>
+      </p:sp>
+      <p:sp>
+        <p:nvSpPr>
+          <p:cNvPr id="8" name="Rectangle 7"/>
+          <p:cNvSpPr/>
+          <p:nvPr/>
+        </p:nvSpPr>
+        <p:spPr>
+          <a:xfrm>
+            <a:off x="25" y="25337264"/>
+            <a:ext cx="18283238" cy="256032"/>
+          </a:xfrm>
+          <a:prstGeom prst="rect">
+            <a:avLst/>
+          </a:prstGeom>
+          <a:solidFill>
+            <a:schemeClr val="accent1"/>
+          </a:solidFill>
+          <a:ln>
+            <a:noFill/>
+          </a:ln>
+        </p:spPr>
+        <p:style>
+          <a:lnRef idx="2">
+            <a:schemeClr val="accent1">
+              <a:shade val="50000"/>
+            </a:schemeClr>
+          </a:lnRef>
+          <a:fillRef idx="1">
+            <a:schemeClr val="accent1"/>
+          </a:fillRef>
+          <a:effectRef idx="0">
+            <a:schemeClr val="accent1"/>
+          </a:effectRef>
+          <a:fontRef idx="minor">
+            <a:schemeClr val="lt1"/>
+          </a:fontRef>
+        </p:style>
+      </p:sp>
+      <p:sp>
+        <p:nvSpPr>
           <p:cNvPr id="2" name="Vertical Title 1"/>
           <p:cNvSpPr>
             <a:spLocks noGrp="1"/>
@@ -935,8 +1149,8 @@
         </p:nvSpPr>
         <p:spPr>
           <a:xfrm>
-            <a:off x="13087351" y="1460500"/>
-            <a:ext cx="3943350" cy="23247352"/>
+            <a:off x="13087351" y="1659118"/>
+            <a:ext cx="3943350" cy="23029684"/>
           </a:xfrm>
         </p:spPr>
         <p:txBody>
@@ -963,12 +1177,12 @@
         </p:nvSpPr>
         <p:spPr>
           <a:xfrm>
-            <a:off x="1257301" y="1460500"/>
-            <a:ext cx="11601450" cy="23247352"/>
-          </a:xfrm>
-        </p:spPr>
-        <p:txBody>
-          <a:bodyPr vert="eaVert"/>
+            <a:off x="1257301" y="1659116"/>
+            <a:ext cx="11601450" cy="23029680"/>
+          </a:xfrm>
+        </p:spPr>
+        <p:txBody>
+          <a:bodyPr vert="eaVert" lIns="45720" tIns="0" rIns="45720" bIns="0"/>
           <a:lstStyle/>
           <a:p>
             <a:pPr lvl="0"/>
@@ -1025,7 +1239,7 @@
           <a:p>
             <a:fld id="{7B1138D3-01E9-BE4F-8B6D-32D27699DBB9}" type="datetimeFigureOut">
               <a:rPr lang="en-US" smtClean="0"/>
-              <a:t>4/20/16</a:t>
+              <a:t>4/21/2016</a:t>
             </a:fld>
             <a:endParaRPr lang="en-US"/>
           </a:p>
@@ -1076,7 +1290,7 @@
     </p:spTree>
     <p:extLst>
       <p:ext uri="{BB962C8B-B14F-4D97-AF65-F5344CB8AC3E}">
-        <p14:creationId xmlns:p14="http://schemas.microsoft.com/office/powerpoint/2010/main" val="696611838"/>
+        <p14:creationId xmlns:p14="http://schemas.microsoft.com/office/powerpoint/2010/main" val="2081249967"/>
       </p:ext>
     </p:extLst>
   </p:cSld>
@@ -1195,7 +1409,7 @@
           <a:p>
             <a:fld id="{7B1138D3-01E9-BE4F-8B6D-32D27699DBB9}" type="datetimeFigureOut">
               <a:rPr lang="en-US" smtClean="0"/>
-              <a:t>4/20/16</a:t>
+              <a:t>4/21/2016</a:t>
             </a:fld>
             <a:endParaRPr lang="en-US"/>
           </a:p>
@@ -1246,7 +1460,7 @@
     </p:spTree>
     <p:extLst>
       <p:ext uri="{BB962C8B-B14F-4D97-AF65-F5344CB8AC3E}">
-        <p14:creationId xmlns:p14="http://schemas.microsoft.com/office/powerpoint/2010/main" val="1789772089"/>
+        <p14:creationId xmlns:p14="http://schemas.microsoft.com/office/powerpoint/2010/main" val="3062372995"/>
       </p:ext>
     </p:extLst>
   </p:cSld>
@@ -1257,8 +1471,16 @@
 </file>
 
 <file path=ppt/slideLayouts/slideLayout3.xml><?xml version="1.0" encoding="utf-8"?>
-<p:sldLayout xmlns:a="http://schemas.openxmlformats.org/drawingml/2006/main" xmlns:r="http://schemas.openxmlformats.org/officeDocument/2006/relationships" xmlns:p="http://schemas.openxmlformats.org/presentationml/2006/main" type="secHead" preserve="1">
+<p:sldLayout xmlns:a="http://schemas.openxmlformats.org/drawingml/2006/main" xmlns:r="http://schemas.openxmlformats.org/officeDocument/2006/relationships" xmlns:p="http://schemas.openxmlformats.org/presentationml/2006/main" showMasterSp="0" type="secHead" preserve="1">
   <p:cSld name="Section Header">
+    <p:bg>
+      <p:bgPr>
+        <a:solidFill>
+          <a:schemeClr val="bg1"/>
+        </a:solidFill>
+        <a:effectLst/>
+      </p:bgPr>
+    </p:bg>
     <p:spTree>
       <p:nvGrpSpPr>
         <p:cNvPr id="1" name=""/>
@@ -1275,6 +1497,82 @@
       </p:grpSpPr>
       <p:sp>
         <p:nvSpPr>
+          <p:cNvPr id="7" name="Rectangle 6"/>
+          <p:cNvSpPr/>
+          <p:nvPr/>
+        </p:nvSpPr>
+        <p:spPr>
+          <a:xfrm>
+            <a:off x="4765" y="25603200"/>
+            <a:ext cx="18283238" cy="1828800"/>
+          </a:xfrm>
+          <a:prstGeom prst="rect">
+            <a:avLst/>
+          </a:prstGeom>
+          <a:solidFill>
+            <a:schemeClr val="accent2"/>
+          </a:solidFill>
+          <a:ln>
+            <a:noFill/>
+          </a:ln>
+        </p:spPr>
+        <p:style>
+          <a:lnRef idx="2">
+            <a:schemeClr val="accent1">
+              <a:shade val="50000"/>
+            </a:schemeClr>
+          </a:lnRef>
+          <a:fillRef idx="1">
+            <a:schemeClr val="accent1"/>
+          </a:fillRef>
+          <a:effectRef idx="0">
+            <a:schemeClr val="accent1"/>
+          </a:effectRef>
+          <a:fontRef idx="minor">
+            <a:schemeClr val="lt1"/>
+          </a:fontRef>
+        </p:style>
+      </p:sp>
+      <p:sp>
+        <p:nvSpPr>
+          <p:cNvPr id="8" name="Rectangle 7"/>
+          <p:cNvSpPr/>
+          <p:nvPr/>
+        </p:nvSpPr>
+        <p:spPr>
+          <a:xfrm>
+            <a:off x="25" y="25337264"/>
+            <a:ext cx="18283238" cy="256032"/>
+          </a:xfrm>
+          <a:prstGeom prst="rect">
+            <a:avLst/>
+          </a:prstGeom>
+          <a:solidFill>
+            <a:schemeClr val="accent1"/>
+          </a:solidFill>
+          <a:ln>
+            <a:noFill/>
+          </a:ln>
+        </p:spPr>
+        <p:style>
+          <a:lnRef idx="2">
+            <a:schemeClr val="accent1">
+              <a:shade val="50000"/>
+            </a:schemeClr>
+          </a:lnRef>
+          <a:fillRef idx="1">
+            <a:schemeClr val="accent1"/>
+          </a:fillRef>
+          <a:effectRef idx="0">
+            <a:schemeClr val="accent1"/>
+          </a:effectRef>
+          <a:fontRef idx="minor">
+            <a:schemeClr val="lt1"/>
+          </a:fontRef>
+        </p:style>
+      </p:sp>
+      <p:sp>
+        <p:nvSpPr>
           <p:cNvPr id="2" name="Title 1"/>
           <p:cNvSpPr>
             <a:spLocks noGrp="1"/>
@@ -1285,56 +1583,71 @@
         </p:nvSpPr>
         <p:spPr>
           <a:xfrm>
-            <a:off x="1247776" y="6838958"/>
-            <a:ext cx="15773400" cy="11410948"/>
-          </a:xfrm>
-        </p:spPr>
-        <p:txBody>
-          <a:bodyPr anchor="b"/>
+            <a:off x="1645920" y="3035808"/>
+            <a:ext cx="15087600" cy="14264640"/>
+          </a:xfrm>
+        </p:spPr>
+        <p:txBody>
+          <a:bodyPr anchor="b" anchorCtr="0">
+            <a:normAutofit/>
+          </a:bodyPr>
           <a:lstStyle>
             <a:lvl1pPr>
-              <a:defRPr sz="12000"/>
-            </a:lvl1pPr>
-          </a:lstStyle>
-          <a:p>
-            <a:r>
-              <a:rPr lang="en-US" smtClean="0"/>
-              <a:t>Click to edit Master title style</a:t>
-            </a:r>
-            <a:endParaRPr lang="en-US" dirty="0"/>
-          </a:p>
-        </p:txBody>
-      </p:sp>
-      <p:sp>
-        <p:nvSpPr>
-          <p:cNvPr id="3" name="Text Placeholder 2"/>
-          <p:cNvSpPr>
-            <a:spLocks noGrp="1"/>
-          </p:cNvSpPr>
-          <p:nvPr>
-            <p:ph type="body" idx="1"/>
-          </p:nvPr>
-        </p:nvSpPr>
-        <p:spPr>
-          <a:xfrm>
-            <a:off x="1247776" y="18357858"/>
-            <a:ext cx="15773400" cy="6000748"/>
-          </a:xfrm>
-        </p:spPr>
-        <p:txBody>
-          <a:bodyPr/>
-          <a:lstStyle>
-            <a:lvl1pPr marL="0" indent="0">
-              <a:buNone/>
-              <a:defRPr sz="4800">
+              <a:lnSpc>
+                <a:spcPct val="85000"/>
+              </a:lnSpc>
+              <a:defRPr sz="16000" b="0">
                 <a:solidFill>
-                  <a:schemeClr val="tx1"/>
+                  <a:schemeClr val="tx1">
+                    <a:lumMod val="85000"/>
+                    <a:lumOff val="15000"/>
+                  </a:schemeClr>
                 </a:solidFill>
               </a:defRPr>
             </a:lvl1pPr>
+          </a:lstStyle>
+          <a:p>
+            <a:r>
+              <a:rPr lang="en-US" smtClean="0"/>
+              <a:t>Click to edit Master title style</a:t>
+            </a:r>
+            <a:endParaRPr lang="en-US" dirty="0"/>
+          </a:p>
+        </p:txBody>
+      </p:sp>
+      <p:sp>
+        <p:nvSpPr>
+          <p:cNvPr id="3" name="Text Placeholder 2"/>
+          <p:cNvSpPr>
+            <a:spLocks noGrp="1"/>
+          </p:cNvSpPr>
+          <p:nvPr>
+            <p:ph type="body" idx="1"/>
+          </p:nvPr>
+        </p:nvSpPr>
+        <p:spPr>
+          <a:xfrm>
+            <a:off x="1645920" y="17812512"/>
+            <a:ext cx="15087600" cy="4572000"/>
+          </a:xfrm>
+        </p:spPr>
+        <p:txBody>
+          <a:bodyPr lIns="91440" rIns="91440" anchor="t" anchorCtr="0">
+            <a:normAutofit/>
+          </a:bodyPr>
+          <a:lstStyle>
+            <a:lvl1pPr marL="0" indent="0">
+              <a:buNone/>
+              <a:defRPr sz="4800" cap="all" spc="400" baseline="0">
+                <a:solidFill>
+                  <a:schemeClr val="tx2"/>
+                </a:solidFill>
+                <a:latin typeface="+mj-lt"/>
+              </a:defRPr>
+            </a:lvl1pPr>
             <a:lvl2pPr marL="914400" indent="0">
               <a:buNone/>
-              <a:defRPr sz="4000">
+              <a:defRPr sz="3600">
                 <a:solidFill>
                   <a:schemeClr val="tx1">
                     <a:tint val="75000"/>
@@ -1344,7 +1657,7 @@
             </a:lvl2pPr>
             <a:lvl3pPr marL="1828800" indent="0">
               <a:buNone/>
-              <a:defRPr sz="3600">
+              <a:defRPr sz="3200">
                 <a:solidFill>
                   <a:schemeClr val="tx1">
                     <a:tint val="75000"/>
@@ -1354,7 +1667,7 @@
             </a:lvl3pPr>
             <a:lvl4pPr marL="2743200" indent="0">
               <a:buNone/>
-              <a:defRPr sz="3200">
+              <a:defRPr sz="2800">
                 <a:solidFill>
                   <a:schemeClr val="tx1">
                     <a:tint val="75000"/>
@@ -1364,7 +1677,7 @@
             </a:lvl4pPr>
             <a:lvl5pPr marL="3657600" indent="0">
               <a:buNone/>
-              <a:defRPr sz="3200">
+              <a:defRPr sz="2800">
                 <a:solidFill>
                   <a:schemeClr val="tx1">
                     <a:tint val="75000"/>
@@ -1374,7 +1687,7 @@
             </a:lvl5pPr>
             <a:lvl6pPr marL="4572000" indent="0">
               <a:buNone/>
-              <a:defRPr sz="3200">
+              <a:defRPr sz="2800">
                 <a:solidFill>
                   <a:schemeClr val="tx1">
                     <a:tint val="75000"/>
@@ -1384,7 +1697,7 @@
             </a:lvl6pPr>
             <a:lvl7pPr marL="5486400" indent="0">
               <a:buNone/>
-              <a:defRPr sz="3200">
+              <a:defRPr sz="2800">
                 <a:solidFill>
                   <a:schemeClr val="tx1">
                     <a:tint val="75000"/>
@@ -1394,7 +1707,7 @@
             </a:lvl7pPr>
             <a:lvl8pPr marL="6400800" indent="0">
               <a:buNone/>
-              <a:defRPr sz="3200">
+              <a:defRPr sz="2800">
                 <a:solidFill>
                   <a:schemeClr val="tx1">
                     <a:tint val="75000"/>
@@ -1404,7 +1717,7 @@
             </a:lvl8pPr>
             <a:lvl9pPr marL="7315200" indent="0">
               <a:buNone/>
-              <a:defRPr sz="3200">
+              <a:defRPr sz="2800">
                 <a:solidFill>
                   <a:schemeClr val="tx1">
                     <a:tint val="75000"/>
@@ -1439,7 +1752,7 @@
           <a:p>
             <a:fld id="{7B1138D3-01E9-BE4F-8B6D-32D27699DBB9}" type="datetimeFigureOut">
               <a:rPr lang="en-US" smtClean="0"/>
-              <a:t>4/20/16</a:t>
+              <a:t>4/21/2016</a:t>
             </a:fld>
             <a:endParaRPr lang="en-US"/>
           </a:p>
@@ -1487,10 +1800,48 @@
           </a:p>
         </p:txBody>
       </p:sp>
+      <p:cxnSp>
+        <p:nvCxnSpPr>
+          <p:cNvPr id="9" name="Straight Connector 8"/>
+          <p:cNvCxnSpPr/>
+          <p:nvPr/>
+        </p:nvCxnSpPr>
+        <p:spPr>
+          <a:xfrm>
+            <a:off x="1811488" y="17373600"/>
+            <a:ext cx="14813280" cy="0"/>
+          </a:xfrm>
+          <a:prstGeom prst="line">
+            <a:avLst/>
+          </a:prstGeom>
+          <a:ln w="6350">
+            <a:solidFill>
+              <a:schemeClr val="tx1">
+                <a:lumMod val="50000"/>
+                <a:lumOff val="50000"/>
+              </a:schemeClr>
+            </a:solidFill>
+          </a:ln>
+        </p:spPr>
+        <p:style>
+          <a:lnRef idx="1">
+            <a:schemeClr val="accent1"/>
+          </a:lnRef>
+          <a:fillRef idx="0">
+            <a:schemeClr val="accent1"/>
+          </a:fillRef>
+          <a:effectRef idx="0">
+            <a:schemeClr val="accent1"/>
+          </a:effectRef>
+          <a:fontRef idx="minor">
+            <a:schemeClr val="tx1"/>
+          </a:fontRef>
+        </p:style>
+      </p:cxnSp>
     </p:spTree>
     <p:extLst>
       <p:ext uri="{BB962C8B-B14F-4D97-AF65-F5344CB8AC3E}">
-        <p14:creationId xmlns:p14="http://schemas.microsoft.com/office/powerpoint/2010/main" val="896056294"/>
+        <p14:creationId xmlns:p14="http://schemas.microsoft.com/office/powerpoint/2010/main" val="1468226068"/>
       </p:ext>
     </p:extLst>
   </p:cSld>
@@ -1519,7 +1870,7 @@
       </p:grpSpPr>
       <p:sp>
         <p:nvSpPr>
-          <p:cNvPr id="2" name="Title 1"/>
+          <p:cNvPr id="8" name="Title 7"/>
           <p:cNvSpPr>
             <a:spLocks noGrp="1"/>
           </p:cNvSpPr>
@@ -1527,7 +1878,12 @@
             <p:ph type="title"/>
           </p:nvPr>
         </p:nvSpPr>
-        <p:spPr/>
+        <p:spPr>
+          <a:xfrm>
+            <a:off x="1645920" y="1146418"/>
+            <a:ext cx="15087600" cy="5803028"/>
+          </a:xfrm>
+        </p:spPr>
         <p:txBody>
           <a:bodyPr/>
           <a:lstStyle/>
@@ -1552,8 +1908,8 @@
         </p:nvSpPr>
         <p:spPr>
           <a:xfrm>
-            <a:off x="1257300" y="7302500"/>
-            <a:ext cx="7772400" cy="17405352"/>
+            <a:off x="1645920" y="7382936"/>
+            <a:ext cx="7406640" cy="16093440"/>
           </a:xfrm>
         </p:spPr>
         <p:txBody>
@@ -1609,8 +1965,8 @@
         </p:nvSpPr>
         <p:spPr>
           <a:xfrm>
-            <a:off x="9258300" y="7302500"/>
-            <a:ext cx="7772400" cy="17405352"/>
+            <a:off x="9326880" y="7382946"/>
+            <a:ext cx="7406640" cy="16093436"/>
           </a:xfrm>
         </p:spPr>
         <p:txBody>
@@ -1671,7 +2027,7 @@
           <a:p>
             <a:fld id="{7B1138D3-01E9-BE4F-8B6D-32D27699DBB9}" type="datetimeFigureOut">
               <a:rPr lang="en-US" smtClean="0"/>
-              <a:t>4/20/16</a:t>
+              <a:t>4/21/2016</a:t>
             </a:fld>
             <a:endParaRPr lang="en-US"/>
           </a:p>
@@ -1722,7 +2078,7 @@
     </p:spTree>
     <p:extLst>
       <p:ext uri="{BB962C8B-B14F-4D97-AF65-F5344CB8AC3E}">
-        <p14:creationId xmlns:p14="http://schemas.microsoft.com/office/powerpoint/2010/main" val="1862800494"/>
+        <p14:creationId xmlns:p14="http://schemas.microsoft.com/office/powerpoint/2010/main" val="779188179"/>
       </p:ext>
     </p:extLst>
   </p:cSld>
@@ -1751,7 +2107,7 @@
       </p:grpSpPr>
       <p:sp>
         <p:nvSpPr>
-          <p:cNvPr id="2" name="Title 1"/>
+          <p:cNvPr id="10" name="Title 9"/>
           <p:cNvSpPr>
             <a:spLocks noGrp="1"/>
           </p:cNvSpPr>
@@ -1761,8 +2117,8 @@
         </p:nvSpPr>
         <p:spPr>
           <a:xfrm>
-            <a:off x="1259682" y="1460506"/>
-            <a:ext cx="15773400" cy="5302252"/>
+            <a:off x="1645920" y="1146418"/>
+            <a:ext cx="15087600" cy="5803028"/>
           </a:xfrm>
         </p:spPr>
         <p:txBody>
@@ -1789,16 +2145,22 @@
         </p:nvSpPr>
         <p:spPr>
           <a:xfrm>
-            <a:off x="1259684" y="6724652"/>
-            <a:ext cx="7736680" cy="3295648"/>
-          </a:xfrm>
-        </p:spPr>
-        <p:txBody>
-          <a:bodyPr anchor="b"/>
+            <a:off x="1645920" y="7384208"/>
+            <a:ext cx="7406640" cy="2945128"/>
+          </a:xfrm>
+        </p:spPr>
+        <p:txBody>
+          <a:bodyPr lIns="91440" rIns="91440" anchor="ctr">
+            <a:normAutofit/>
+          </a:bodyPr>
           <a:lstStyle>
             <a:lvl1pPr marL="0" indent="0">
               <a:buNone/>
-              <a:defRPr sz="4800" b="1"/>
+              <a:defRPr sz="4000" b="0" cap="all" baseline="0">
+                <a:solidFill>
+                  <a:schemeClr val="tx2"/>
+                </a:solidFill>
+              </a:defRPr>
             </a:lvl1pPr>
             <a:lvl2pPr marL="914400" indent="0">
               <a:buNone/>
@@ -1854,8 +2216,8 @@
         </p:nvSpPr>
         <p:spPr>
           <a:xfrm>
-            <a:off x="1259684" y="10020300"/>
-            <a:ext cx="7736680" cy="14738352"/>
+            <a:off x="1645920" y="10329336"/>
+            <a:ext cx="7406640" cy="13147040"/>
           </a:xfrm>
         </p:spPr>
         <p:txBody>
@@ -1911,16 +2273,22 @@
         </p:nvSpPr>
         <p:spPr>
           <a:xfrm>
-            <a:off x="9258301" y="6724652"/>
-            <a:ext cx="7774782" cy="3295648"/>
-          </a:xfrm>
-        </p:spPr>
-        <p:txBody>
-          <a:bodyPr anchor="b"/>
+            <a:off x="9326880" y="7384208"/>
+            <a:ext cx="7406640" cy="2945128"/>
+          </a:xfrm>
+        </p:spPr>
+        <p:txBody>
+          <a:bodyPr lIns="91440" rIns="91440" anchor="ctr">
+            <a:normAutofit/>
+          </a:bodyPr>
           <a:lstStyle>
             <a:lvl1pPr marL="0" indent="0">
               <a:buNone/>
-              <a:defRPr sz="4800" b="1"/>
+              <a:defRPr sz="4000" b="0" cap="all" baseline="0">
+                <a:solidFill>
+                  <a:schemeClr val="tx2"/>
+                </a:solidFill>
+              </a:defRPr>
             </a:lvl1pPr>
             <a:lvl2pPr marL="914400" indent="0">
               <a:buNone/>
@@ -1976,8 +2344,8 @@
         </p:nvSpPr>
         <p:spPr>
           <a:xfrm>
-            <a:off x="9258301" y="10020300"/>
-            <a:ext cx="7774782" cy="14738352"/>
+            <a:off x="9326880" y="10329336"/>
+            <a:ext cx="7406640" cy="13147040"/>
           </a:xfrm>
         </p:spPr>
         <p:txBody>
@@ -2038,7 +2406,7 @@
           <a:p>
             <a:fld id="{7B1138D3-01E9-BE4F-8B6D-32D27699DBB9}" type="datetimeFigureOut">
               <a:rPr lang="en-US" smtClean="0"/>
-              <a:t>4/20/16</a:t>
+              <a:t>4/21/2016</a:t>
             </a:fld>
             <a:endParaRPr lang="en-US"/>
           </a:p>
@@ -2089,7 +2457,7 @@
     </p:spTree>
     <p:extLst>
       <p:ext uri="{BB962C8B-B14F-4D97-AF65-F5344CB8AC3E}">
-        <p14:creationId xmlns:p14="http://schemas.microsoft.com/office/powerpoint/2010/main" val="2071296692"/>
+        <p14:creationId xmlns:p14="http://schemas.microsoft.com/office/powerpoint/2010/main" val="124549636"/>
       </p:ext>
     </p:extLst>
   </p:cSld>
@@ -2156,7 +2524,7 @@
           <a:p>
             <a:fld id="{7B1138D3-01E9-BE4F-8B6D-32D27699DBB9}" type="datetimeFigureOut">
               <a:rPr lang="en-US" smtClean="0"/>
-              <a:t>4/20/16</a:t>
+              <a:t>4/21/2016</a:t>
             </a:fld>
             <a:endParaRPr lang="en-US"/>
           </a:p>
@@ -2207,7 +2575,7 @@
     </p:spTree>
     <p:extLst>
       <p:ext uri="{BB962C8B-B14F-4D97-AF65-F5344CB8AC3E}">
-        <p14:creationId xmlns:p14="http://schemas.microsoft.com/office/powerpoint/2010/main" val="1573584574"/>
+        <p14:creationId xmlns:p14="http://schemas.microsoft.com/office/powerpoint/2010/main" val="2492647273"/>
       </p:ext>
     </p:extLst>
   </p:cSld>
@@ -2218,7 +2586,7 @@
 </file>
 
 <file path=ppt/slideLayouts/slideLayout7.xml><?xml version="1.0" encoding="utf-8"?>
-<p:sldLayout xmlns:a="http://schemas.openxmlformats.org/drawingml/2006/main" xmlns:r="http://schemas.openxmlformats.org/officeDocument/2006/relationships" xmlns:p="http://schemas.openxmlformats.org/presentationml/2006/main" type="blank" preserve="1">
+<p:sldLayout xmlns:a="http://schemas.openxmlformats.org/drawingml/2006/main" xmlns:r="http://schemas.openxmlformats.org/officeDocument/2006/relationships" xmlns:p="http://schemas.openxmlformats.org/presentationml/2006/main" showMasterSp="0" type="blank" preserve="1">
   <p:cSld name="Blank">
     <p:spTree>
       <p:nvGrpSpPr>
@@ -2236,7 +2604,83 @@
       </p:grpSpPr>
       <p:sp>
         <p:nvSpPr>
-          <p:cNvPr id="2" name="Date Placeholder 1"/>
+          <p:cNvPr id="5" name="Rectangle 4"/>
+          <p:cNvSpPr/>
+          <p:nvPr/>
+        </p:nvSpPr>
+        <p:spPr>
+          <a:xfrm>
+            <a:off x="4765" y="25603200"/>
+            <a:ext cx="18283238" cy="1828800"/>
+          </a:xfrm>
+          <a:prstGeom prst="rect">
+            <a:avLst/>
+          </a:prstGeom>
+          <a:solidFill>
+            <a:schemeClr val="accent2"/>
+          </a:solidFill>
+          <a:ln>
+            <a:noFill/>
+          </a:ln>
+        </p:spPr>
+        <p:style>
+          <a:lnRef idx="2">
+            <a:schemeClr val="accent1">
+              <a:shade val="50000"/>
+            </a:schemeClr>
+          </a:lnRef>
+          <a:fillRef idx="1">
+            <a:schemeClr val="accent1"/>
+          </a:fillRef>
+          <a:effectRef idx="0">
+            <a:schemeClr val="accent1"/>
+          </a:effectRef>
+          <a:fontRef idx="minor">
+            <a:schemeClr val="lt1"/>
+          </a:fontRef>
+        </p:style>
+      </p:sp>
+      <p:sp>
+        <p:nvSpPr>
+          <p:cNvPr id="6" name="Rectangle 5"/>
+          <p:cNvSpPr/>
+          <p:nvPr/>
+        </p:nvSpPr>
+        <p:spPr>
+          <a:xfrm>
+            <a:off x="25" y="25337264"/>
+            <a:ext cx="18283238" cy="256032"/>
+          </a:xfrm>
+          <a:prstGeom prst="rect">
+            <a:avLst/>
+          </a:prstGeom>
+          <a:solidFill>
+            <a:schemeClr val="accent1"/>
+          </a:solidFill>
+          <a:ln>
+            <a:noFill/>
+          </a:ln>
+        </p:spPr>
+        <p:style>
+          <a:lnRef idx="2">
+            <a:schemeClr val="accent1">
+              <a:shade val="50000"/>
+            </a:schemeClr>
+          </a:lnRef>
+          <a:fillRef idx="1">
+            <a:schemeClr val="accent1"/>
+          </a:fillRef>
+          <a:effectRef idx="0">
+            <a:schemeClr val="accent1"/>
+          </a:effectRef>
+          <a:fontRef idx="minor">
+            <a:schemeClr val="lt1"/>
+          </a:fontRef>
+        </p:style>
+      </p:sp>
+      <p:sp>
+        <p:nvSpPr>
+          <p:cNvPr id="7" name="Date Placeholder 6"/>
           <p:cNvSpPr>
             <a:spLocks noGrp="1"/>
           </p:cNvSpPr>
@@ -2251,7 +2695,7 @@
           <a:p>
             <a:fld id="{7B1138D3-01E9-BE4F-8B6D-32D27699DBB9}" type="datetimeFigureOut">
               <a:rPr lang="en-US" smtClean="0"/>
-              <a:t>4/20/16</a:t>
+              <a:t>4/21/2016</a:t>
             </a:fld>
             <a:endParaRPr lang="en-US"/>
           </a:p>
@@ -2259,7 +2703,7 @@
       </p:sp>
       <p:sp>
         <p:nvSpPr>
-          <p:cNvPr id="3" name="Footer Placeholder 2"/>
+          <p:cNvPr id="8" name="Footer Placeholder 7"/>
           <p:cNvSpPr>
             <a:spLocks noGrp="1"/>
           </p:cNvSpPr>
@@ -2270,7 +2714,15 @@
         <p:spPr/>
         <p:txBody>
           <a:bodyPr/>
-          <a:lstStyle/>
+          <a:lstStyle>
+            <a:lvl1pPr>
+              <a:defRPr>
+                <a:solidFill>
+                  <a:srgbClr val="FFFFFF"/>
+                </a:solidFill>
+              </a:defRPr>
+            </a:lvl1pPr>
+          </a:lstStyle>
           <a:p>
             <a:endParaRPr lang="en-US"/>
           </a:p>
@@ -2278,7 +2730,7 @@
       </p:sp>
       <p:sp>
         <p:nvSpPr>
-          <p:cNvPr id="4" name="Slide Number Placeholder 3"/>
+          <p:cNvPr id="9" name="Slide Number Placeholder 8"/>
           <p:cNvSpPr>
             <a:spLocks noGrp="1"/>
           </p:cNvSpPr>
@@ -2302,7 +2754,7 @@
     </p:spTree>
     <p:extLst>
       <p:ext uri="{BB962C8B-B14F-4D97-AF65-F5344CB8AC3E}">
-        <p14:creationId xmlns:p14="http://schemas.microsoft.com/office/powerpoint/2010/main" val="974822413"/>
+        <p14:creationId xmlns:p14="http://schemas.microsoft.com/office/powerpoint/2010/main" val="3069112033"/>
       </p:ext>
     </p:extLst>
   </p:cSld>
@@ -2313,7 +2765,7 @@
 </file>
 
 <file path=ppt/slideLayouts/slideLayout8.xml><?xml version="1.0" encoding="utf-8"?>
-<p:sldLayout xmlns:a="http://schemas.openxmlformats.org/drawingml/2006/main" xmlns:r="http://schemas.openxmlformats.org/officeDocument/2006/relationships" xmlns:p="http://schemas.openxmlformats.org/presentationml/2006/main" type="objTx" preserve="1">
+<p:sldLayout xmlns:a="http://schemas.openxmlformats.org/drawingml/2006/main" xmlns:r="http://schemas.openxmlformats.org/officeDocument/2006/relationships" xmlns:p="http://schemas.openxmlformats.org/presentationml/2006/main" showMasterSp="0" type="objTx" preserve="1">
   <p:cSld name="Content with Caption">
     <p:spTree>
       <p:nvGrpSpPr>
@@ -2331,6 +2783,82 @@
       </p:grpSpPr>
       <p:sp>
         <p:nvSpPr>
+          <p:cNvPr id="8" name="Rectangle 7"/>
+          <p:cNvSpPr/>
+          <p:nvPr/>
+        </p:nvSpPr>
+        <p:spPr>
+          <a:xfrm>
+            <a:off x="27" y="0"/>
+            <a:ext cx="6076186" cy="27432000"/>
+          </a:xfrm>
+          <a:prstGeom prst="rect">
+            <a:avLst/>
+          </a:prstGeom>
+          <a:solidFill>
+            <a:schemeClr val="accent2"/>
+          </a:solidFill>
+          <a:ln>
+            <a:noFill/>
+          </a:ln>
+        </p:spPr>
+        <p:style>
+          <a:lnRef idx="2">
+            <a:schemeClr val="accent1">
+              <a:shade val="50000"/>
+            </a:schemeClr>
+          </a:lnRef>
+          <a:fillRef idx="1">
+            <a:schemeClr val="accent1"/>
+          </a:fillRef>
+          <a:effectRef idx="0">
+            <a:schemeClr val="accent1"/>
+          </a:effectRef>
+          <a:fontRef idx="minor">
+            <a:schemeClr val="lt1"/>
+          </a:fontRef>
+        </p:style>
+      </p:sp>
+      <p:sp>
+        <p:nvSpPr>
+          <p:cNvPr id="9" name="Rectangle 8"/>
+          <p:cNvSpPr/>
+          <p:nvPr/>
+        </p:nvSpPr>
+        <p:spPr>
+          <a:xfrm>
+            <a:off x="6060106" y="0"/>
+            <a:ext cx="96012" cy="27432000"/>
+          </a:xfrm>
+          <a:prstGeom prst="rect">
+            <a:avLst/>
+          </a:prstGeom>
+          <a:solidFill>
+            <a:schemeClr val="accent1"/>
+          </a:solidFill>
+          <a:ln>
+            <a:noFill/>
+          </a:ln>
+        </p:spPr>
+        <p:style>
+          <a:lnRef idx="2">
+            <a:schemeClr val="accent1">
+              <a:shade val="50000"/>
+            </a:schemeClr>
+          </a:lnRef>
+          <a:fillRef idx="1">
+            <a:schemeClr val="accent1"/>
+          </a:fillRef>
+          <a:effectRef idx="0">
+            <a:schemeClr val="accent1"/>
+          </a:effectRef>
+          <a:fontRef idx="minor">
+            <a:schemeClr val="lt1"/>
+          </a:fontRef>
+        </p:style>
+      </p:sp>
+      <p:sp>
+        <p:nvSpPr>
           <p:cNvPr id="2" name="Title 1"/>
           <p:cNvSpPr>
             <a:spLocks noGrp="1"/>
@@ -2341,15 +2869,21 @@
         </p:nvSpPr>
         <p:spPr>
           <a:xfrm>
-            <a:off x="1259682" y="1828800"/>
-            <a:ext cx="5898356" cy="6400800"/>
-          </a:xfrm>
-        </p:spPr>
-        <p:txBody>
-          <a:bodyPr anchor="b"/>
+            <a:off x="685800" y="2377436"/>
+            <a:ext cx="4800600" cy="9144000"/>
+          </a:xfrm>
+        </p:spPr>
+        <p:txBody>
+          <a:bodyPr anchor="b">
+            <a:normAutofit/>
+          </a:bodyPr>
           <a:lstStyle>
             <a:lvl1pPr>
-              <a:defRPr sz="6400"/>
+              <a:defRPr sz="7200" b="0">
+                <a:solidFill>
+                  <a:srgbClr val="FFFFFF"/>
+                </a:solidFill>
+              </a:defRPr>
             </a:lvl1pPr>
           </a:lstStyle>
           <a:p>
@@ -2373,200 +2907,208 @@
         </p:nvSpPr>
         <p:spPr>
           <a:xfrm>
-            <a:off x="7774782" y="3949706"/>
-            <a:ext cx="9258300" cy="19494500"/>
-          </a:xfrm>
-        </p:spPr>
+            <a:off x="6920475" y="2926080"/>
+            <a:ext cx="10018786" cy="21031200"/>
+          </a:xfrm>
+        </p:spPr>
+        <p:txBody>
+          <a:bodyPr/>
+          <a:lstStyle/>
+          <a:p>
+            <a:pPr lvl="0"/>
+            <a:r>
+              <a:rPr lang="en-US" smtClean="0"/>
+              <a:t>Click to edit Master text styles</a:t>
+            </a:r>
+          </a:p>
+          <a:p>
+            <a:pPr lvl="1"/>
+            <a:r>
+              <a:rPr lang="en-US" smtClean="0"/>
+              <a:t>Second level</a:t>
+            </a:r>
+          </a:p>
+          <a:p>
+            <a:pPr lvl="2"/>
+            <a:r>
+              <a:rPr lang="en-US" smtClean="0"/>
+              <a:t>Third level</a:t>
+            </a:r>
+          </a:p>
+          <a:p>
+            <a:pPr lvl="3"/>
+            <a:r>
+              <a:rPr lang="en-US" smtClean="0"/>
+              <a:t>Fourth level</a:t>
+            </a:r>
+          </a:p>
+          <a:p>
+            <a:pPr lvl="4"/>
+            <a:r>
+              <a:rPr lang="en-US" smtClean="0"/>
+              <a:t>Fifth level</a:t>
+            </a:r>
+            <a:endParaRPr lang="en-US" dirty="0"/>
+          </a:p>
+        </p:txBody>
+      </p:sp>
+      <p:sp>
+        <p:nvSpPr>
+          <p:cNvPr id="4" name="Text Placeholder 3"/>
+          <p:cNvSpPr>
+            <a:spLocks noGrp="1"/>
+          </p:cNvSpPr>
+          <p:nvPr>
+            <p:ph type="body" sz="half" idx="2"/>
+          </p:nvPr>
+        </p:nvSpPr>
+        <p:spPr>
+          <a:xfrm>
+            <a:off x="685800" y="11704320"/>
+            <a:ext cx="4800600" cy="13516496"/>
+          </a:xfrm>
+        </p:spPr>
+        <p:txBody>
+          <a:bodyPr lIns="91440" rIns="91440">
+            <a:normAutofit/>
+          </a:bodyPr>
+          <a:lstStyle>
+            <a:lvl1pPr marL="0" indent="0">
+              <a:buNone/>
+              <a:defRPr sz="3000">
+                <a:solidFill>
+                  <a:srgbClr val="FFFFFF"/>
+                </a:solidFill>
+              </a:defRPr>
+            </a:lvl1pPr>
+            <a:lvl2pPr marL="914400" indent="0">
+              <a:buNone/>
+              <a:defRPr sz="2400"/>
+            </a:lvl2pPr>
+            <a:lvl3pPr marL="1828800" indent="0">
+              <a:buNone/>
+              <a:defRPr sz="2000"/>
+            </a:lvl3pPr>
+            <a:lvl4pPr marL="2743200" indent="0">
+              <a:buNone/>
+              <a:defRPr sz="1800"/>
+            </a:lvl4pPr>
+            <a:lvl5pPr marL="3657600" indent="0">
+              <a:buNone/>
+              <a:defRPr sz="1800"/>
+            </a:lvl5pPr>
+            <a:lvl6pPr marL="4572000" indent="0">
+              <a:buNone/>
+              <a:defRPr sz="1800"/>
+            </a:lvl6pPr>
+            <a:lvl7pPr marL="5486400" indent="0">
+              <a:buNone/>
+              <a:defRPr sz="1800"/>
+            </a:lvl7pPr>
+            <a:lvl8pPr marL="6400800" indent="0">
+              <a:buNone/>
+              <a:defRPr sz="1800"/>
+            </a:lvl8pPr>
+            <a:lvl9pPr marL="7315200" indent="0">
+              <a:buNone/>
+              <a:defRPr sz="1800"/>
+            </a:lvl9pPr>
+          </a:lstStyle>
+          <a:p>
+            <a:pPr lvl="0"/>
+            <a:r>
+              <a:rPr lang="en-US" smtClean="0"/>
+              <a:t>Click to edit Master text styles</a:t>
+            </a:r>
+          </a:p>
+        </p:txBody>
+      </p:sp>
+      <p:sp>
+        <p:nvSpPr>
+          <p:cNvPr id="5" name="Date Placeholder 4"/>
+          <p:cNvSpPr>
+            <a:spLocks noGrp="1"/>
+          </p:cNvSpPr>
+          <p:nvPr>
+            <p:ph type="dt" sz="half" idx="10"/>
+          </p:nvPr>
+        </p:nvSpPr>
+        <p:spPr>
+          <a:xfrm>
+            <a:off x="698269" y="25839146"/>
+            <a:ext cx="3927766" cy="1460500"/>
+          </a:xfrm>
+        </p:spPr>
+        <p:txBody>
+          <a:bodyPr/>
+          <a:lstStyle>
+            <a:lvl1pPr algn="l">
+              <a:defRPr/>
+            </a:lvl1pPr>
+          </a:lstStyle>
+          <a:p>
+            <a:fld id="{7B1138D3-01E9-BE4F-8B6D-32D27699DBB9}" type="datetimeFigureOut">
+              <a:rPr lang="en-US" smtClean="0"/>
+              <a:t>4/21/2016</a:t>
+            </a:fld>
+            <a:endParaRPr lang="en-US"/>
+          </a:p>
+        </p:txBody>
+      </p:sp>
+      <p:sp>
+        <p:nvSpPr>
+          <p:cNvPr id="6" name="Footer Placeholder 5"/>
+          <p:cNvSpPr>
+            <a:spLocks noGrp="1"/>
+          </p:cNvSpPr>
+          <p:nvPr>
+            <p:ph type="ftr" sz="quarter" idx="11"/>
+          </p:nvPr>
+        </p:nvSpPr>
+        <p:spPr>
+          <a:xfrm>
+            <a:off x="7200900" y="25839146"/>
+            <a:ext cx="6972300" cy="1460500"/>
+          </a:xfrm>
+        </p:spPr>
+        <p:txBody>
+          <a:bodyPr/>
+          <a:lstStyle>
+            <a:lvl1pPr algn="l">
+              <a:defRPr>
+                <a:solidFill>
+                  <a:schemeClr val="tx2"/>
+                </a:solidFill>
+              </a:defRPr>
+            </a:lvl1pPr>
+          </a:lstStyle>
+          <a:p>
+            <a:endParaRPr lang="en-US"/>
+          </a:p>
+        </p:txBody>
+      </p:sp>
+      <p:sp>
+        <p:nvSpPr>
+          <p:cNvPr id="7" name="Slide Number Placeholder 6"/>
+          <p:cNvSpPr>
+            <a:spLocks noGrp="1"/>
+          </p:cNvSpPr>
+          <p:nvPr>
+            <p:ph type="sldNum" sz="quarter" idx="12"/>
+          </p:nvPr>
+        </p:nvSpPr>
+        <p:spPr/>
         <p:txBody>
           <a:bodyPr/>
           <a:lstStyle>
             <a:lvl1pPr>
-              <a:defRPr sz="6400"/>
+              <a:defRPr>
+                <a:solidFill>
+                  <a:schemeClr val="tx2"/>
+                </a:solidFill>
+              </a:defRPr>
             </a:lvl1pPr>
-            <a:lvl2pPr>
-              <a:defRPr sz="5600"/>
-            </a:lvl2pPr>
-            <a:lvl3pPr>
-              <a:defRPr sz="4800"/>
-            </a:lvl3pPr>
-            <a:lvl4pPr>
-              <a:defRPr sz="4000"/>
-            </a:lvl4pPr>
-            <a:lvl5pPr>
-              <a:defRPr sz="4000"/>
-            </a:lvl5pPr>
-            <a:lvl6pPr>
-              <a:defRPr sz="4000"/>
-            </a:lvl6pPr>
-            <a:lvl7pPr>
-              <a:defRPr sz="4000"/>
-            </a:lvl7pPr>
-            <a:lvl8pPr>
-              <a:defRPr sz="4000"/>
-            </a:lvl8pPr>
-            <a:lvl9pPr>
-              <a:defRPr sz="4000"/>
-            </a:lvl9pPr>
           </a:lstStyle>
-          <a:p>
-            <a:pPr lvl="0"/>
-            <a:r>
-              <a:rPr lang="en-US" smtClean="0"/>
-              <a:t>Click to edit Master text styles</a:t>
-            </a:r>
-          </a:p>
-          <a:p>
-            <a:pPr lvl="1"/>
-            <a:r>
-              <a:rPr lang="en-US" smtClean="0"/>
-              <a:t>Second level</a:t>
-            </a:r>
-          </a:p>
-          <a:p>
-            <a:pPr lvl="2"/>
-            <a:r>
-              <a:rPr lang="en-US" smtClean="0"/>
-              <a:t>Third level</a:t>
-            </a:r>
-          </a:p>
-          <a:p>
-            <a:pPr lvl="3"/>
-            <a:r>
-              <a:rPr lang="en-US" smtClean="0"/>
-              <a:t>Fourth level</a:t>
-            </a:r>
-          </a:p>
-          <a:p>
-            <a:pPr lvl="4"/>
-            <a:r>
-              <a:rPr lang="en-US" smtClean="0"/>
-              <a:t>Fifth level</a:t>
-            </a:r>
-            <a:endParaRPr lang="en-US" dirty="0"/>
-          </a:p>
-        </p:txBody>
-      </p:sp>
-      <p:sp>
-        <p:nvSpPr>
-          <p:cNvPr id="4" name="Text Placeholder 3"/>
-          <p:cNvSpPr>
-            <a:spLocks noGrp="1"/>
-          </p:cNvSpPr>
-          <p:nvPr>
-            <p:ph type="body" sz="half" idx="2"/>
-          </p:nvPr>
-        </p:nvSpPr>
-        <p:spPr>
-          <a:xfrm>
-            <a:off x="1259682" y="8229600"/>
-            <a:ext cx="5898356" cy="15246352"/>
-          </a:xfrm>
-        </p:spPr>
-        <p:txBody>
-          <a:bodyPr/>
-          <a:lstStyle>
-            <a:lvl1pPr marL="0" indent="0">
-              <a:buNone/>
-              <a:defRPr sz="3200"/>
-            </a:lvl1pPr>
-            <a:lvl2pPr marL="914400" indent="0">
-              <a:buNone/>
-              <a:defRPr sz="2800"/>
-            </a:lvl2pPr>
-            <a:lvl3pPr marL="1828800" indent="0">
-              <a:buNone/>
-              <a:defRPr sz="2400"/>
-            </a:lvl3pPr>
-            <a:lvl4pPr marL="2743200" indent="0">
-              <a:buNone/>
-              <a:defRPr sz="2000"/>
-            </a:lvl4pPr>
-            <a:lvl5pPr marL="3657600" indent="0">
-              <a:buNone/>
-              <a:defRPr sz="2000"/>
-            </a:lvl5pPr>
-            <a:lvl6pPr marL="4572000" indent="0">
-              <a:buNone/>
-              <a:defRPr sz="2000"/>
-            </a:lvl6pPr>
-            <a:lvl7pPr marL="5486400" indent="0">
-              <a:buNone/>
-              <a:defRPr sz="2000"/>
-            </a:lvl7pPr>
-            <a:lvl8pPr marL="6400800" indent="0">
-              <a:buNone/>
-              <a:defRPr sz="2000"/>
-            </a:lvl8pPr>
-            <a:lvl9pPr marL="7315200" indent="0">
-              <a:buNone/>
-              <a:defRPr sz="2000"/>
-            </a:lvl9pPr>
-          </a:lstStyle>
-          <a:p>
-            <a:pPr lvl="0"/>
-            <a:r>
-              <a:rPr lang="en-US" smtClean="0"/>
-              <a:t>Click to edit Master text styles</a:t>
-            </a:r>
-          </a:p>
-        </p:txBody>
-      </p:sp>
-      <p:sp>
-        <p:nvSpPr>
-          <p:cNvPr id="5" name="Date Placeholder 4"/>
-          <p:cNvSpPr>
-            <a:spLocks noGrp="1"/>
-          </p:cNvSpPr>
-          <p:nvPr>
-            <p:ph type="dt" sz="half" idx="10"/>
-          </p:nvPr>
-        </p:nvSpPr>
-        <p:spPr/>
-        <p:txBody>
-          <a:bodyPr/>
-          <a:lstStyle/>
-          <a:p>
-            <a:fld id="{7B1138D3-01E9-BE4F-8B6D-32D27699DBB9}" type="datetimeFigureOut">
-              <a:rPr lang="en-US" smtClean="0"/>
-              <a:t>4/20/16</a:t>
-            </a:fld>
-            <a:endParaRPr lang="en-US"/>
-          </a:p>
-        </p:txBody>
-      </p:sp>
-      <p:sp>
-        <p:nvSpPr>
-          <p:cNvPr id="6" name="Footer Placeholder 5"/>
-          <p:cNvSpPr>
-            <a:spLocks noGrp="1"/>
-          </p:cNvSpPr>
-          <p:nvPr>
-            <p:ph type="ftr" sz="quarter" idx="11"/>
-          </p:nvPr>
-        </p:nvSpPr>
-        <p:spPr/>
-        <p:txBody>
-          <a:bodyPr/>
-          <a:lstStyle/>
-          <a:p>
-            <a:endParaRPr lang="en-US"/>
-          </a:p>
-        </p:txBody>
-      </p:sp>
-      <p:sp>
-        <p:nvSpPr>
-          <p:cNvPr id="7" name="Slide Number Placeholder 6"/>
-          <p:cNvSpPr>
-            <a:spLocks noGrp="1"/>
-          </p:cNvSpPr>
-          <p:nvPr>
-            <p:ph type="sldNum" sz="quarter" idx="12"/>
-          </p:nvPr>
-        </p:nvSpPr>
-        <p:spPr/>
-        <p:txBody>
-          <a:bodyPr/>
-          <a:lstStyle/>
           <a:p>
             <a:fld id="{B018B3EE-E7A3-EB40-9A93-33FEFFDC6626}" type="slidenum">
               <a:rPr lang="en-US" smtClean="0"/>
@@ -2579,7 +3121,7 @@
     </p:spTree>
     <p:extLst>
       <p:ext uri="{BB962C8B-B14F-4D97-AF65-F5344CB8AC3E}">
-        <p14:creationId xmlns:p14="http://schemas.microsoft.com/office/powerpoint/2010/main" val="687552328"/>
+        <p14:creationId xmlns:p14="http://schemas.microsoft.com/office/powerpoint/2010/main" val="3065351093"/>
       </p:ext>
     </p:extLst>
   </p:cSld>
@@ -2590,7 +3132,7 @@
 </file>
 
 <file path=ppt/slideLayouts/slideLayout9.xml><?xml version="1.0" encoding="utf-8"?>
-<p:sldLayout xmlns:a="http://schemas.openxmlformats.org/drawingml/2006/main" xmlns:r="http://schemas.openxmlformats.org/officeDocument/2006/relationships" xmlns:p="http://schemas.openxmlformats.org/presentationml/2006/main" type="picTx" preserve="1">
+<p:sldLayout xmlns:a="http://schemas.openxmlformats.org/drawingml/2006/main" xmlns:r="http://schemas.openxmlformats.org/officeDocument/2006/relationships" xmlns:p="http://schemas.openxmlformats.org/presentationml/2006/main" showMasterSp="0" type="picTx" preserve="1">
   <p:cSld name="Picture with Caption">
     <p:spTree>
       <p:nvGrpSpPr>
@@ -2608,6 +3150,82 @@
       </p:grpSpPr>
       <p:sp>
         <p:nvSpPr>
+          <p:cNvPr id="8" name="Rectangle 7"/>
+          <p:cNvSpPr/>
+          <p:nvPr/>
+        </p:nvSpPr>
+        <p:spPr>
+          <a:xfrm>
+            <a:off x="1" y="19812000"/>
+            <a:ext cx="18283238" cy="7620000"/>
+          </a:xfrm>
+          <a:prstGeom prst="rect">
+            <a:avLst/>
+          </a:prstGeom>
+          <a:solidFill>
+            <a:schemeClr val="accent2"/>
+          </a:solidFill>
+          <a:ln>
+            <a:noFill/>
+          </a:ln>
+        </p:spPr>
+        <p:style>
+          <a:lnRef idx="2">
+            <a:schemeClr val="accent1">
+              <a:shade val="50000"/>
+            </a:schemeClr>
+          </a:lnRef>
+          <a:fillRef idx="1">
+            <a:schemeClr val="accent1"/>
+          </a:fillRef>
+          <a:effectRef idx="0">
+            <a:schemeClr val="accent1"/>
+          </a:effectRef>
+          <a:fontRef idx="minor">
+            <a:schemeClr val="lt1"/>
+          </a:fontRef>
+        </p:style>
+      </p:sp>
+      <p:sp>
+        <p:nvSpPr>
+          <p:cNvPr id="9" name="Rectangle 8"/>
+          <p:cNvSpPr/>
+          <p:nvPr/>
+        </p:nvSpPr>
+        <p:spPr>
+          <a:xfrm>
+            <a:off x="25" y="19660304"/>
+            <a:ext cx="18283238" cy="256032"/>
+          </a:xfrm>
+          <a:prstGeom prst="rect">
+            <a:avLst/>
+          </a:prstGeom>
+          <a:solidFill>
+            <a:schemeClr val="accent1"/>
+          </a:solidFill>
+          <a:ln>
+            <a:noFill/>
+          </a:ln>
+        </p:spPr>
+        <p:style>
+          <a:lnRef idx="2">
+            <a:schemeClr val="accent1">
+              <a:shade val="50000"/>
+            </a:schemeClr>
+          </a:lnRef>
+          <a:fillRef idx="1">
+            <a:schemeClr val="accent1"/>
+          </a:fillRef>
+          <a:effectRef idx="0">
+            <a:schemeClr val="accent1"/>
+          </a:effectRef>
+          <a:fontRef idx="minor">
+            <a:schemeClr val="lt1"/>
+          </a:fontRef>
+        </p:style>
+      </p:sp>
+      <p:sp>
+        <p:nvSpPr>
           <p:cNvPr id="2" name="Title 1"/>
           <p:cNvSpPr>
             <a:spLocks noGrp="1"/>
@@ -2618,15 +3236,21 @@
         </p:nvSpPr>
         <p:spPr>
           <a:xfrm>
-            <a:off x="1259682" y="1828800"/>
-            <a:ext cx="5898356" cy="6400800"/>
-          </a:xfrm>
-        </p:spPr>
-        <p:txBody>
-          <a:bodyPr anchor="b"/>
+            <a:off x="1645920" y="20299680"/>
+            <a:ext cx="15179040" cy="3291840"/>
+          </a:xfrm>
+        </p:spPr>
+        <p:txBody>
+          <a:bodyPr tIns="0" bIns="0" anchor="b">
+            <a:noAutofit/>
+          </a:bodyPr>
           <a:lstStyle>
             <a:lvl1pPr>
-              <a:defRPr sz="6400"/>
+              <a:defRPr sz="7200" b="0">
+                <a:solidFill>
+                  <a:srgbClr val="FFFFFF"/>
+                </a:solidFill>
+              </a:defRPr>
             </a:lvl1pPr>
           </a:lstStyle>
           <a:p>
@@ -2650,16 +3274,26 @@
         </p:nvSpPr>
         <p:spPr>
           <a:xfrm>
-            <a:off x="7774782" y="3949706"/>
-            <a:ext cx="9258300" cy="19494500"/>
-          </a:xfrm>
-        </p:spPr>
-        <p:txBody>
-          <a:bodyPr anchor="t"/>
+            <a:off x="25" y="0"/>
+            <a:ext cx="18287978" cy="19660304"/>
+          </a:xfrm>
+          <a:blipFill>
+            <a:blip r:embed="rId2"/>
+            <a:stretch>
+              <a:fillRect/>
+            </a:stretch>
+          </a:blipFill>
+        </p:spPr>
+        <p:txBody>
+          <a:bodyPr lIns="457200" tIns="457200" anchor="t"/>
           <a:lstStyle>
             <a:lvl1pPr marL="0" indent="0">
               <a:buNone/>
-              <a:defRPr sz="6400"/>
+              <a:defRPr sz="6400">
+                <a:solidFill>
+                  <a:schemeClr val="bg1"/>
+                </a:solidFill>
+              </a:defRPr>
             </a:lvl1pPr>
             <a:lvl2pPr marL="914400" indent="0">
               <a:buNone/>
@@ -2697,7 +3331,7 @@
           <a:p>
             <a:r>
               <a:rPr lang="en-US" smtClean="0"/>
-              <a:t>Drag picture to placeholder or click icon to add</a:t>
+              <a:t>Click icon to add picture</a:t>
             </a:r>
             <a:endParaRPr lang="en-US" dirty="0"/>
           </a:p>
@@ -2715,48 +3349,60 @@
         </p:nvSpPr>
         <p:spPr>
           <a:xfrm>
-            <a:off x="1259682" y="8229600"/>
-            <a:ext cx="5898356" cy="15246352"/>
-          </a:xfrm>
-        </p:spPr>
-        <p:txBody>
-          <a:bodyPr/>
+            <a:off x="1645918" y="23628096"/>
+            <a:ext cx="15179040" cy="2377440"/>
+          </a:xfrm>
+        </p:spPr>
+        <p:txBody>
+          <a:bodyPr lIns="91440" tIns="0" rIns="91440" bIns="0">
+            <a:normAutofit/>
+          </a:bodyPr>
           <a:lstStyle>
             <a:lvl1pPr marL="0" indent="0">
-              <a:buNone/>
-              <a:defRPr sz="3200"/>
+              <a:spcBef>
+                <a:spcPts val="0"/>
+              </a:spcBef>
+              <a:spcAft>
+                <a:spcPts val="1200"/>
+              </a:spcAft>
+              <a:buNone/>
+              <a:defRPr sz="3000">
+                <a:solidFill>
+                  <a:srgbClr val="FFFFFF"/>
+                </a:solidFill>
+              </a:defRPr>
             </a:lvl1pPr>
             <a:lvl2pPr marL="914400" indent="0">
               <a:buNone/>
-              <a:defRPr sz="2800"/>
+              <a:defRPr sz="2400"/>
             </a:lvl2pPr>
             <a:lvl3pPr marL="1828800" indent="0">
               <a:buNone/>
-              <a:defRPr sz="2400"/>
+              <a:defRPr sz="2000"/>
             </a:lvl3pPr>
             <a:lvl4pPr marL="2743200" indent="0">
               <a:buNone/>
-              <a:defRPr sz="2000"/>
+              <a:defRPr sz="1800"/>
             </a:lvl4pPr>
             <a:lvl5pPr marL="3657600" indent="0">
               <a:buNone/>
-              <a:defRPr sz="2000"/>
+              <a:defRPr sz="1800"/>
             </a:lvl5pPr>
             <a:lvl6pPr marL="4572000" indent="0">
               <a:buNone/>
-              <a:defRPr sz="2000"/>
+              <a:defRPr sz="1800"/>
             </a:lvl6pPr>
             <a:lvl7pPr marL="5486400" indent="0">
               <a:buNone/>
-              <a:defRPr sz="2000"/>
+              <a:defRPr sz="1800"/>
             </a:lvl7pPr>
             <a:lvl8pPr marL="6400800" indent="0">
               <a:buNone/>
-              <a:defRPr sz="2000"/>
+              <a:defRPr sz="1800"/>
             </a:lvl8pPr>
             <a:lvl9pPr marL="7315200" indent="0">
               <a:buNone/>
-              <a:defRPr sz="2000"/>
+              <a:defRPr sz="1800"/>
             </a:lvl9pPr>
           </a:lstStyle>
           <a:p>
@@ -2785,7 +3431,7 @@
           <a:p>
             <a:fld id="{7B1138D3-01E9-BE4F-8B6D-32D27699DBB9}" type="datetimeFigureOut">
               <a:rPr lang="en-US" smtClean="0"/>
-              <a:t>4/20/16</a:t>
+              <a:t>4/21/2016</a:t>
             </a:fld>
             <a:endParaRPr lang="en-US"/>
           </a:p>
@@ -2836,7 +3482,7 @@
     </p:spTree>
     <p:extLst>
       <p:ext uri="{BB962C8B-B14F-4D97-AF65-F5344CB8AC3E}">
-        <p14:creationId xmlns:p14="http://schemas.microsoft.com/office/powerpoint/2010/main" val="82472189"/>
+        <p14:creationId xmlns:p14="http://schemas.microsoft.com/office/powerpoint/2010/main" val="3412393916"/>
       </p:ext>
     </p:extLst>
   </p:cSld>
@@ -2870,25 +3516,101 @@
       </p:grpSpPr>
       <p:sp>
         <p:nvSpPr>
-          <p:cNvPr id="2" name="Title Placeholder 1"/>
-          <p:cNvSpPr>
-            <a:spLocks noGrp="1"/>
-          </p:cNvSpPr>
-          <p:nvPr>
-            <p:ph type="title"/>
-          </p:nvPr>
-        </p:nvSpPr>
-        <p:spPr>
-          <a:xfrm>
-            <a:off x="1257300" y="1460506"/>
-            <a:ext cx="15773400" cy="5302252"/>
+          <p:cNvPr id="7" name="Rectangle 6"/>
+          <p:cNvSpPr/>
+          <p:nvPr/>
+        </p:nvSpPr>
+        <p:spPr>
+          <a:xfrm>
+            <a:off x="1" y="25603200"/>
+            <a:ext cx="18288002" cy="1828800"/>
           </a:xfrm>
           <a:prstGeom prst="rect">
             <a:avLst/>
           </a:prstGeom>
-        </p:spPr>
-        <p:txBody>
-          <a:bodyPr vert="horz" lIns="91440" tIns="45720" rIns="91440" bIns="45720" rtlCol="0" anchor="ctr">
+          <a:solidFill>
+            <a:schemeClr val="accent2"/>
+          </a:solidFill>
+          <a:ln>
+            <a:noFill/>
+          </a:ln>
+        </p:spPr>
+        <p:style>
+          <a:lnRef idx="2">
+            <a:schemeClr val="accent1">
+              <a:shade val="50000"/>
+            </a:schemeClr>
+          </a:lnRef>
+          <a:fillRef idx="1">
+            <a:schemeClr val="accent1"/>
+          </a:fillRef>
+          <a:effectRef idx="0">
+            <a:schemeClr val="accent1"/>
+          </a:effectRef>
+          <a:fontRef idx="minor">
+            <a:schemeClr val="lt1"/>
+          </a:fontRef>
+        </p:style>
+      </p:sp>
+      <p:sp>
+        <p:nvSpPr>
+          <p:cNvPr id="9" name="Rectangle 8"/>
+          <p:cNvSpPr/>
+          <p:nvPr/>
+        </p:nvSpPr>
+        <p:spPr>
+          <a:xfrm>
+            <a:off x="1" y="25337262"/>
+            <a:ext cx="18288002" cy="263996"/>
+          </a:xfrm>
+          <a:prstGeom prst="rect">
+            <a:avLst/>
+          </a:prstGeom>
+          <a:solidFill>
+            <a:schemeClr val="accent1"/>
+          </a:solidFill>
+          <a:ln>
+            <a:noFill/>
+          </a:ln>
+        </p:spPr>
+        <p:style>
+          <a:lnRef idx="2">
+            <a:schemeClr val="accent1">
+              <a:shade val="50000"/>
+            </a:schemeClr>
+          </a:lnRef>
+          <a:fillRef idx="1">
+            <a:schemeClr val="accent1"/>
+          </a:fillRef>
+          <a:effectRef idx="0">
+            <a:schemeClr val="accent1"/>
+          </a:effectRef>
+          <a:fontRef idx="minor">
+            <a:schemeClr val="lt1"/>
+          </a:fontRef>
+        </p:style>
+      </p:sp>
+      <p:sp>
+        <p:nvSpPr>
+          <p:cNvPr id="2" name="Title Placeholder 1"/>
+          <p:cNvSpPr>
+            <a:spLocks noGrp="1"/>
+          </p:cNvSpPr>
+          <p:nvPr>
+            <p:ph type="title"/>
+          </p:nvPr>
+        </p:nvSpPr>
+        <p:spPr>
+          <a:xfrm>
+            <a:off x="1645920" y="1146418"/>
+            <a:ext cx="15087600" cy="5803028"/>
+          </a:xfrm>
+          <a:prstGeom prst="rect">
+            <a:avLst/>
+          </a:prstGeom>
+        </p:spPr>
+        <p:txBody>
+          <a:bodyPr vert="horz" lIns="91440" tIns="45720" rIns="91440" bIns="45720" rtlCol="0" anchor="b">
             <a:normAutofit/>
           </a:bodyPr>
           <a:lstStyle/>
@@ -2913,15 +3635,15 @@
         </p:nvSpPr>
         <p:spPr>
           <a:xfrm>
-            <a:off x="1257300" y="7302500"/>
-            <a:ext cx="15773400" cy="17405352"/>
+            <a:off x="1645919" y="7382936"/>
+            <a:ext cx="15087602" cy="16093440"/>
           </a:xfrm>
           <a:prstGeom prst="rect">
             <a:avLst/>
           </a:prstGeom>
         </p:spPr>
         <p:txBody>
-          <a:bodyPr vert="horz" lIns="91440" tIns="45720" rIns="91440" bIns="45720" rtlCol="0">
+          <a:bodyPr vert="horz" lIns="0" tIns="45720" rIns="0" bIns="45720" rtlCol="0">
             <a:normAutofit/>
           </a:bodyPr>
           <a:lstStyle/>
@@ -2975,8 +3697,8 @@
         </p:nvSpPr>
         <p:spPr>
           <a:xfrm>
-            <a:off x="1257300" y="25425406"/>
-            <a:ext cx="4114800" cy="1460500"/>
+            <a:off x="1645923" y="25839146"/>
+            <a:ext cx="3708406" cy="1460500"/>
           </a:xfrm>
           <a:prstGeom prst="rect">
             <a:avLst/>
@@ -2986,11 +3708,9 @@
           <a:bodyPr vert="horz" lIns="91440" tIns="45720" rIns="91440" bIns="45720" rtlCol="0" anchor="ctr"/>
           <a:lstStyle>
             <a:lvl1pPr algn="l">
-              <a:defRPr sz="2400">
+              <a:defRPr sz="1800">
                 <a:solidFill>
-                  <a:schemeClr val="tx1">
-                    <a:tint val="75000"/>
-                  </a:schemeClr>
+                  <a:srgbClr val="FFFFFF"/>
                 </a:solidFill>
               </a:defRPr>
             </a:lvl1pPr>
@@ -2998,7 +3718,7 @@
           <a:p>
             <a:fld id="{7B1138D3-01E9-BE4F-8B6D-32D27699DBB9}" type="datetimeFigureOut">
               <a:rPr lang="en-US" smtClean="0"/>
-              <a:t>4/20/16</a:t>
+              <a:t>4/21/2016</a:t>
             </a:fld>
             <a:endParaRPr lang="en-US"/>
           </a:p>
@@ -3016,8 +3736,8 @@
         </p:nvSpPr>
         <p:spPr>
           <a:xfrm>
-            <a:off x="6057900" y="25425406"/>
-            <a:ext cx="6172200" cy="1460500"/>
+            <a:off x="5529279" y="25839146"/>
+            <a:ext cx="7234206" cy="1460500"/>
           </a:xfrm>
           <a:prstGeom prst="rect">
             <a:avLst/>
@@ -3027,11 +3747,9 @@
           <a:bodyPr vert="horz" lIns="91440" tIns="45720" rIns="91440" bIns="45720" rtlCol="0" anchor="ctr"/>
           <a:lstStyle>
             <a:lvl1pPr algn="ctr">
-              <a:defRPr sz="2400">
+              <a:defRPr sz="1800" cap="all" baseline="0">
                 <a:solidFill>
-                  <a:schemeClr val="tx1">
-                    <a:tint val="75000"/>
-                  </a:schemeClr>
+                  <a:srgbClr val="FFFFFF"/>
                 </a:solidFill>
               </a:defRPr>
             </a:lvl1pPr>
@@ -3053,8 +3771,8 @@
         </p:nvSpPr>
         <p:spPr>
           <a:xfrm>
-            <a:off x="12915900" y="25425406"/>
-            <a:ext cx="4114800" cy="1460500"/>
+            <a:off x="14850689" y="25839146"/>
+            <a:ext cx="1968038" cy="1460500"/>
           </a:xfrm>
           <a:prstGeom prst="rect">
             <a:avLst/>
@@ -3064,11 +3782,9 @@
           <a:bodyPr vert="horz" lIns="91440" tIns="45720" rIns="91440" bIns="45720" rtlCol="0" anchor="ctr"/>
           <a:lstStyle>
             <a:lvl1pPr algn="r">
-              <a:defRPr sz="2400">
+              <a:defRPr sz="2100">
                 <a:solidFill>
-                  <a:schemeClr val="tx1">
-                    <a:tint val="75000"/>
-                  </a:schemeClr>
+                  <a:srgbClr val="FFFFFF"/>
                 </a:solidFill>
               </a:defRPr>
             </a:lvl1pPr>
@@ -3082,40 +3798,81 @@
           </a:p>
         </p:txBody>
       </p:sp>
+      <p:cxnSp>
+        <p:nvCxnSpPr>
+          <p:cNvPr id="10" name="Straight Connector 9"/>
+          <p:cNvCxnSpPr/>
+          <p:nvPr/>
+        </p:nvCxnSpPr>
+        <p:spPr>
+          <a:xfrm>
+            <a:off x="1790298" y="6951380"/>
+            <a:ext cx="14950440" cy="0"/>
+          </a:xfrm>
+          <a:prstGeom prst="line">
+            <a:avLst/>
+          </a:prstGeom>
+          <a:ln w="6350">
+            <a:solidFill>
+              <a:schemeClr val="tx1">
+                <a:lumMod val="50000"/>
+                <a:lumOff val="50000"/>
+              </a:schemeClr>
+            </a:solidFill>
+          </a:ln>
+        </p:spPr>
+        <p:style>
+          <a:lnRef idx="1">
+            <a:schemeClr val="accent1"/>
+          </a:lnRef>
+          <a:fillRef idx="0">
+            <a:schemeClr val="accent1"/>
+          </a:fillRef>
+          <a:effectRef idx="0">
+            <a:schemeClr val="accent1"/>
+          </a:effectRef>
+          <a:fontRef idx="minor">
+            <a:schemeClr val="tx1"/>
+          </a:fontRef>
+        </p:style>
+      </p:cxnSp>
     </p:spTree>
     <p:extLst>
       <p:ext uri="{BB962C8B-B14F-4D97-AF65-F5344CB8AC3E}">
-        <p14:creationId xmlns:p14="http://schemas.microsoft.com/office/powerpoint/2010/main" val="616246274"/>
+        <p14:creationId xmlns:p14="http://schemas.microsoft.com/office/powerpoint/2010/main" val="4024436085"/>
       </p:ext>
     </p:extLst>
   </p:cSld>
   <p:clrMap bg1="lt1" tx1="dk1" bg2="lt2" tx2="dk2" accent1="accent1" accent2="accent2" accent3="accent3" accent4="accent4" accent5="accent5" accent6="accent6" hlink="hlink" folHlink="folHlink"/>
   <p:sldLayoutIdLst>
-    <p:sldLayoutId id="2147483661" r:id="rId1"/>
-    <p:sldLayoutId id="2147483662" r:id="rId2"/>
-    <p:sldLayoutId id="2147483663" r:id="rId3"/>
-    <p:sldLayoutId id="2147483664" r:id="rId4"/>
-    <p:sldLayoutId id="2147483665" r:id="rId5"/>
-    <p:sldLayoutId id="2147483666" r:id="rId6"/>
-    <p:sldLayoutId id="2147483667" r:id="rId7"/>
-    <p:sldLayoutId id="2147483668" r:id="rId8"/>
-    <p:sldLayoutId id="2147483669" r:id="rId9"/>
-    <p:sldLayoutId id="2147483670" r:id="rId10"/>
-    <p:sldLayoutId id="2147483671" r:id="rId11"/>
+    <p:sldLayoutId id="2147483673" r:id="rId1"/>
+    <p:sldLayoutId id="2147483674" r:id="rId2"/>
+    <p:sldLayoutId id="2147483675" r:id="rId3"/>
+    <p:sldLayoutId id="2147483676" r:id="rId4"/>
+    <p:sldLayoutId id="2147483677" r:id="rId5"/>
+    <p:sldLayoutId id="2147483678" r:id="rId6"/>
+    <p:sldLayoutId id="2147483679" r:id="rId7"/>
+    <p:sldLayoutId id="2147483680" r:id="rId8"/>
+    <p:sldLayoutId id="2147483681" r:id="rId9"/>
+    <p:sldLayoutId id="2147483682" r:id="rId10"/>
+    <p:sldLayoutId id="2147483683" r:id="rId11"/>
   </p:sldLayoutIdLst>
   <p:txStyles>
     <p:titleStyle>
       <a:lvl1pPr algn="l" defTabSz="1828800" rtl="0" eaLnBrk="1" latinLnBrk="0" hangingPunct="1">
         <a:lnSpc>
-          <a:spcPct val="90000"/>
+          <a:spcPct val="85000"/>
         </a:lnSpc>
         <a:spcBef>
           <a:spcPct val="0"/>
         </a:spcBef>
         <a:buNone/>
-        <a:defRPr sz="8800" kern="1200">
+        <a:defRPr sz="9600" kern="1200" spc="-100" baseline="0">
           <a:solidFill>
-            <a:schemeClr val="tx1"/>
+            <a:schemeClr val="tx1">
+              <a:lumMod val="75000"/>
+              <a:lumOff val="25000"/>
+            </a:schemeClr>
           </a:solidFill>
           <a:latin typeface="+mj-lt"/>
           <a:ea typeface="+mj-ea"/>
@@ -3124,162 +3881,244 @@
       </a:lvl1pPr>
     </p:titleStyle>
     <p:bodyStyle>
-      <a:lvl1pPr marL="457200" indent="-457200" algn="l" defTabSz="1828800" rtl="0" eaLnBrk="1" latinLnBrk="0" hangingPunct="1">
+      <a:lvl1pPr marL="182880" indent="-182880" algn="l" defTabSz="1828800" rtl="0" eaLnBrk="1" latinLnBrk="0" hangingPunct="1">
         <a:lnSpc>
           <a:spcPct val="90000"/>
         </a:lnSpc>
         <a:spcBef>
-          <a:spcPts val="2000"/>
+          <a:spcPts val="2400"/>
         </a:spcBef>
-        <a:buFont typeface="Arial" panose="020B0604020202020204" pitchFamily="34" charset="0"/>
-        <a:buChar char="•"/>
-        <a:defRPr sz="5600" kern="1200">
+        <a:spcAft>
+          <a:spcPts val="400"/>
+        </a:spcAft>
+        <a:buClr>
+          <a:schemeClr val="accent1"/>
+        </a:buClr>
+        <a:buSzPct val="100000"/>
+        <a:buFont typeface="Calibri" panose="020F0502020204030204" pitchFamily="34" charset="0"/>
+        <a:buChar char=" "/>
+        <a:defRPr sz="4000" kern="1200">
           <a:solidFill>
-            <a:schemeClr val="tx1"/>
+            <a:schemeClr val="tx1">
+              <a:lumMod val="75000"/>
+              <a:lumOff val="25000"/>
+            </a:schemeClr>
           </a:solidFill>
           <a:latin typeface="+mn-lt"/>
           <a:ea typeface="+mn-ea"/>
           <a:cs typeface="+mn-cs"/>
         </a:defRPr>
       </a:lvl1pPr>
-      <a:lvl2pPr marL="1371600" indent="-457200" algn="l" defTabSz="1828800" rtl="0" eaLnBrk="1" latinLnBrk="0" hangingPunct="1">
+      <a:lvl2pPr marL="768096" indent="-365760" algn="l" defTabSz="1828800" rtl="0" eaLnBrk="1" latinLnBrk="0" hangingPunct="1">
         <a:lnSpc>
           <a:spcPct val="90000"/>
         </a:lnSpc>
         <a:spcBef>
-          <a:spcPts val="1000"/>
+          <a:spcPts val="400"/>
         </a:spcBef>
-        <a:buFont typeface="Arial" panose="020B0604020202020204" pitchFamily="34" charset="0"/>
-        <a:buChar char="•"/>
-        <a:defRPr sz="4800" kern="1200">
+        <a:spcAft>
+          <a:spcPts val="800"/>
+        </a:spcAft>
+        <a:buClr>
+          <a:schemeClr val="accent1"/>
+        </a:buClr>
+        <a:buFont typeface="Calibri" pitchFamily="34" charset="0"/>
+        <a:buChar char="◦"/>
+        <a:defRPr sz="3600" kern="1200">
           <a:solidFill>
-            <a:schemeClr val="tx1"/>
+            <a:schemeClr val="tx1">
+              <a:lumMod val="75000"/>
+              <a:lumOff val="25000"/>
+            </a:schemeClr>
           </a:solidFill>
           <a:latin typeface="+mn-lt"/>
           <a:ea typeface="+mn-ea"/>
           <a:cs typeface="+mn-cs"/>
         </a:defRPr>
       </a:lvl2pPr>
-      <a:lvl3pPr marL="2286000" indent="-457200" algn="l" defTabSz="1828800" rtl="0" eaLnBrk="1" latinLnBrk="0" hangingPunct="1">
+      <a:lvl3pPr marL="1133856" indent="-365760" algn="l" defTabSz="1828800" rtl="0" eaLnBrk="1" latinLnBrk="0" hangingPunct="1">
         <a:lnSpc>
           <a:spcPct val="90000"/>
         </a:lnSpc>
         <a:spcBef>
-          <a:spcPts val="1000"/>
+          <a:spcPts val="400"/>
         </a:spcBef>
-        <a:buFont typeface="Arial" panose="020B0604020202020204" pitchFamily="34" charset="0"/>
-        <a:buChar char="•"/>
-        <a:defRPr sz="4000" kern="1200">
+        <a:spcAft>
+          <a:spcPts val="800"/>
+        </a:spcAft>
+        <a:buClr>
+          <a:schemeClr val="accent1"/>
+        </a:buClr>
+        <a:buFont typeface="Calibri" pitchFamily="34" charset="0"/>
+        <a:buChar char="◦"/>
+        <a:defRPr sz="2800" kern="1200">
           <a:solidFill>
-            <a:schemeClr val="tx1"/>
+            <a:schemeClr val="tx1">
+              <a:lumMod val="75000"/>
+              <a:lumOff val="25000"/>
+            </a:schemeClr>
           </a:solidFill>
           <a:latin typeface="+mn-lt"/>
           <a:ea typeface="+mn-ea"/>
           <a:cs typeface="+mn-cs"/>
         </a:defRPr>
       </a:lvl3pPr>
-      <a:lvl4pPr marL="3200400" indent="-457200" algn="l" defTabSz="1828800" rtl="0" eaLnBrk="1" latinLnBrk="0" hangingPunct="1">
+      <a:lvl4pPr marL="1499616" indent="-365760" algn="l" defTabSz="1828800" rtl="0" eaLnBrk="1" latinLnBrk="0" hangingPunct="1">
         <a:lnSpc>
           <a:spcPct val="90000"/>
         </a:lnSpc>
         <a:spcBef>
-          <a:spcPts val="1000"/>
+          <a:spcPts val="400"/>
         </a:spcBef>
-        <a:buFont typeface="Arial" panose="020B0604020202020204" pitchFamily="34" charset="0"/>
-        <a:buChar char="•"/>
-        <a:defRPr sz="3600" kern="1200">
+        <a:spcAft>
+          <a:spcPts val="800"/>
+        </a:spcAft>
+        <a:buClr>
+          <a:schemeClr val="accent1"/>
+        </a:buClr>
+        <a:buFont typeface="Calibri" pitchFamily="34" charset="0"/>
+        <a:buChar char="◦"/>
+        <a:defRPr sz="2800" kern="1200">
           <a:solidFill>
-            <a:schemeClr val="tx1"/>
+            <a:schemeClr val="tx1">
+              <a:lumMod val="75000"/>
+              <a:lumOff val="25000"/>
+            </a:schemeClr>
           </a:solidFill>
           <a:latin typeface="+mn-lt"/>
           <a:ea typeface="+mn-ea"/>
           <a:cs typeface="+mn-cs"/>
         </a:defRPr>
       </a:lvl4pPr>
-      <a:lvl5pPr marL="4114800" indent="-457200" algn="l" defTabSz="1828800" rtl="0" eaLnBrk="1" latinLnBrk="0" hangingPunct="1">
+      <a:lvl5pPr marL="1865376" indent="-365760" algn="l" defTabSz="1828800" rtl="0" eaLnBrk="1" latinLnBrk="0" hangingPunct="1">
         <a:lnSpc>
           <a:spcPct val="90000"/>
         </a:lnSpc>
         <a:spcBef>
-          <a:spcPts val="1000"/>
+          <a:spcPts val="400"/>
         </a:spcBef>
-        <a:buFont typeface="Arial" panose="020B0604020202020204" pitchFamily="34" charset="0"/>
-        <a:buChar char="•"/>
-        <a:defRPr sz="3600" kern="1200">
+        <a:spcAft>
+          <a:spcPts val="800"/>
+        </a:spcAft>
+        <a:buClr>
+          <a:schemeClr val="accent1"/>
+        </a:buClr>
+        <a:buFont typeface="Calibri" pitchFamily="34" charset="0"/>
+        <a:buChar char="◦"/>
+        <a:defRPr sz="2800" kern="1200">
           <a:solidFill>
-            <a:schemeClr val="tx1"/>
+            <a:schemeClr val="tx1">
+              <a:lumMod val="75000"/>
+              <a:lumOff val="25000"/>
+            </a:schemeClr>
           </a:solidFill>
           <a:latin typeface="+mn-lt"/>
           <a:ea typeface="+mn-ea"/>
           <a:cs typeface="+mn-cs"/>
         </a:defRPr>
       </a:lvl5pPr>
-      <a:lvl6pPr marL="5029200" indent="-457200" algn="l" defTabSz="1828800" rtl="0" eaLnBrk="1" latinLnBrk="0" hangingPunct="1">
+      <a:lvl6pPr marL="2200000" indent="-457200" algn="l" defTabSz="1828800" rtl="0" eaLnBrk="1" latinLnBrk="0" hangingPunct="1">
         <a:lnSpc>
           <a:spcPct val="90000"/>
         </a:lnSpc>
         <a:spcBef>
-          <a:spcPts val="1000"/>
+          <a:spcPts val="400"/>
         </a:spcBef>
-        <a:buFont typeface="Arial" panose="020B0604020202020204" pitchFamily="34" charset="0"/>
-        <a:buChar char="•"/>
-        <a:defRPr sz="3600" kern="1200">
+        <a:spcAft>
+          <a:spcPts val="800"/>
+        </a:spcAft>
+        <a:buClr>
+          <a:schemeClr val="accent1"/>
+        </a:buClr>
+        <a:buFont typeface="Calibri" pitchFamily="34" charset="0"/>
+        <a:buChar char="◦"/>
+        <a:defRPr sz="2800" kern="1200">
           <a:solidFill>
-            <a:schemeClr val="tx1"/>
+            <a:schemeClr val="tx1">
+              <a:lumMod val="75000"/>
+              <a:lumOff val="25000"/>
+            </a:schemeClr>
           </a:solidFill>
           <a:latin typeface="+mn-lt"/>
           <a:ea typeface="+mn-ea"/>
           <a:cs typeface="+mn-cs"/>
         </a:defRPr>
       </a:lvl6pPr>
-      <a:lvl7pPr marL="5943600" indent="-457200" algn="l" defTabSz="1828800" rtl="0" eaLnBrk="1" latinLnBrk="0" hangingPunct="1">
+      <a:lvl7pPr marL="2600000" indent="-457200" algn="l" defTabSz="1828800" rtl="0" eaLnBrk="1" latinLnBrk="0" hangingPunct="1">
         <a:lnSpc>
           <a:spcPct val="90000"/>
         </a:lnSpc>
         <a:spcBef>
-          <a:spcPts val="1000"/>
+          <a:spcPts val="400"/>
         </a:spcBef>
-        <a:buFont typeface="Arial" panose="020B0604020202020204" pitchFamily="34" charset="0"/>
-        <a:buChar char="•"/>
-        <a:defRPr sz="3600" kern="1200">
+        <a:spcAft>
+          <a:spcPts val="800"/>
+        </a:spcAft>
+        <a:buClr>
+          <a:schemeClr val="accent1"/>
+        </a:buClr>
+        <a:buFont typeface="Calibri" pitchFamily="34" charset="0"/>
+        <a:buChar char="◦"/>
+        <a:defRPr sz="2800" kern="1200">
           <a:solidFill>
-            <a:schemeClr val="tx1"/>
+            <a:schemeClr val="tx1">
+              <a:lumMod val="75000"/>
+              <a:lumOff val="25000"/>
+            </a:schemeClr>
           </a:solidFill>
           <a:latin typeface="+mn-lt"/>
           <a:ea typeface="+mn-ea"/>
           <a:cs typeface="+mn-cs"/>
         </a:defRPr>
       </a:lvl7pPr>
-      <a:lvl8pPr marL="6858000" indent="-457200" algn="l" defTabSz="1828800" rtl="0" eaLnBrk="1" latinLnBrk="0" hangingPunct="1">
+      <a:lvl8pPr marL="3000000" indent="-457200" algn="l" defTabSz="1828800" rtl="0" eaLnBrk="1" latinLnBrk="0" hangingPunct="1">
         <a:lnSpc>
           <a:spcPct val="90000"/>
         </a:lnSpc>
         <a:spcBef>
-          <a:spcPts val="1000"/>
+          <a:spcPts val="400"/>
         </a:spcBef>
-        <a:buFont typeface="Arial" panose="020B0604020202020204" pitchFamily="34" charset="0"/>
-        <a:buChar char="•"/>
-        <a:defRPr sz="3600" kern="1200">
+        <a:spcAft>
+          <a:spcPts val="800"/>
+        </a:spcAft>
+        <a:buClr>
+          <a:schemeClr val="accent1"/>
+        </a:buClr>
+        <a:buFont typeface="Calibri" pitchFamily="34" charset="0"/>
+        <a:buChar char="◦"/>
+        <a:defRPr sz="2800" kern="1200">
           <a:solidFill>
-            <a:schemeClr val="tx1"/>
+            <a:schemeClr val="tx1">
+              <a:lumMod val="75000"/>
+              <a:lumOff val="25000"/>
+            </a:schemeClr>
           </a:solidFill>
           <a:latin typeface="+mn-lt"/>
           <a:ea typeface="+mn-ea"/>
           <a:cs typeface="+mn-cs"/>
         </a:defRPr>
       </a:lvl8pPr>
-      <a:lvl9pPr marL="7772400" indent="-457200" algn="l" defTabSz="1828800" rtl="0" eaLnBrk="1" latinLnBrk="0" hangingPunct="1">
+      <a:lvl9pPr marL="3400000" indent="-457200" algn="l" defTabSz="1828800" rtl="0" eaLnBrk="1" latinLnBrk="0" hangingPunct="1">
         <a:lnSpc>
           <a:spcPct val="90000"/>
         </a:lnSpc>
         <a:spcBef>
-          <a:spcPts val="1000"/>
+          <a:spcPts val="400"/>
         </a:spcBef>
-        <a:buFont typeface="Arial" panose="020B0604020202020204" pitchFamily="34" charset="0"/>
-        <a:buChar char="•"/>
-        <a:defRPr sz="3600" kern="1200">
+        <a:spcAft>
+          <a:spcPts val="800"/>
+        </a:spcAft>
+        <a:buClr>
+          <a:schemeClr val="accent1"/>
+        </a:buClr>
+        <a:buFont typeface="Calibri" pitchFamily="34" charset="0"/>
+        <a:buChar char="◦"/>
+        <a:defRPr sz="2800" kern="1200">
           <a:solidFill>
-            <a:schemeClr val="tx1"/>
+            <a:schemeClr val="tx1">
+              <a:lumMod val="75000"/>
+              <a:lumOff val="25000"/>
+            </a:schemeClr>
           </a:solidFill>
           <a:latin typeface="+mn-lt"/>
           <a:ea typeface="+mn-ea"/>
@@ -3411,8 +4250,8 @@
         </p:nvSpPr>
         <p:spPr>
           <a:xfrm>
-            <a:off x="4206240" y="4632960"/>
-            <a:ext cx="1441998" cy="757130"/>
+            <a:off x="0" y="2072640"/>
+            <a:ext cx="18288000" cy="923330"/>
           </a:xfrm>
           <a:prstGeom prst="rect">
             <a:avLst/>
@@ -3420,19 +4259,167 @@
           <a:noFill/>
         </p:spPr>
         <p:txBody>
-          <a:bodyPr wrap="none" rtlCol="0">
+          <a:bodyPr wrap="square" rtlCol="0">
             <a:spAutoFit/>
           </a:bodyPr>
           <a:lstStyle/>
           <a:p>
-            <a:r>
-              <a:rPr lang="en-US" smtClean="0"/>
-              <a:t>MAth</a:t>
-            </a:r>
-            <a:endParaRPr lang="en-US"/>
-          </a:p>
-        </p:txBody>
-      </p:sp>
+            <a:pPr algn="ctr"/>
+            <a:r>
+              <a:rPr lang="en-US" sz="5400" dirty="0"/>
+              <a:t>Offline mathematical expression recognizer</a:t>
+            </a:r>
+            <a:endParaRPr lang="en-US" sz="5400" dirty="0"/>
+          </a:p>
+        </p:txBody>
+      </p:sp>
+      <p:pic>
+        <p:nvPicPr>
+          <p:cNvPr id="2" name="Picture 1"/>
+          <p:cNvPicPr>
+            <a:picLocks noChangeAspect="1"/>
+          </p:cNvPicPr>
+          <p:nvPr/>
+        </p:nvPicPr>
+        <p:blipFill>
+          <a:blip r:embed="rId3">
+            <a:extLst>
+              <a:ext uri="{28A0092B-C50C-407E-A947-70E740481C1C}">
+                <a14:useLocalDpi xmlns:a14="http://schemas.microsoft.com/office/drawing/2010/main" val="0"/>
+              </a:ext>
+            </a:extLst>
+          </a:blip>
+          <a:stretch>
+            <a:fillRect/>
+          </a:stretch>
+        </p:blipFill>
+        <p:spPr>
+          <a:xfrm>
+            <a:off x="317500" y="5663184"/>
+            <a:ext cx="2234184" cy="2234184"/>
+          </a:xfrm>
+          <a:prstGeom prst="rect">
+            <a:avLst/>
+          </a:prstGeom>
+        </p:spPr>
+      </p:pic>
+      <p:pic>
+        <p:nvPicPr>
+          <p:cNvPr id="3" name="Picture 2"/>
+          <p:cNvPicPr>
+            <a:picLocks noChangeAspect="1"/>
+          </p:cNvPicPr>
+          <p:nvPr/>
+        </p:nvPicPr>
+        <p:blipFill rotWithShape="1">
+          <a:blip r:embed="rId4">
+            <a:extLst>
+              <a:ext uri="{28A0092B-C50C-407E-A947-70E740481C1C}">
+                <a14:useLocalDpi xmlns:a14="http://schemas.microsoft.com/office/drawing/2010/main" val="0"/>
+              </a:ext>
+            </a:extLst>
+          </a:blip>
+          <a:srcRect b="20469"/>
+          <a:stretch/>
+        </p:blipFill>
+        <p:spPr>
+          <a:xfrm>
+            <a:off x="2904168" y="4824984"/>
+            <a:ext cx="5177648" cy="4291584"/>
+          </a:xfrm>
+          <a:prstGeom prst="rect">
+            <a:avLst/>
+          </a:prstGeom>
+        </p:spPr>
+      </p:pic>
+      <p:pic>
+        <p:nvPicPr>
+          <p:cNvPr id="5" name="Picture 4"/>
+          <p:cNvPicPr>
+            <a:picLocks noChangeAspect="1"/>
+          </p:cNvPicPr>
+          <p:nvPr/>
+        </p:nvPicPr>
+        <p:blipFill>
+          <a:blip r:embed="rId5">
+            <a:extLst>
+              <a:ext uri="{28A0092B-C50C-407E-A947-70E740481C1C}">
+                <a14:useLocalDpi xmlns:a14="http://schemas.microsoft.com/office/drawing/2010/main" val="0"/>
+              </a:ext>
+            </a:extLst>
+          </a:blip>
+          <a:stretch>
+            <a:fillRect/>
+          </a:stretch>
+        </p:blipFill>
+        <p:spPr>
+          <a:xfrm>
+            <a:off x="8434300" y="4824984"/>
+            <a:ext cx="4291584" cy="4291584"/>
+          </a:xfrm>
+          <a:prstGeom prst="rect">
+            <a:avLst/>
+          </a:prstGeom>
+        </p:spPr>
+      </p:pic>
+      <p:pic>
+        <p:nvPicPr>
+          <p:cNvPr id="6" name="Picture 5"/>
+          <p:cNvPicPr>
+            <a:picLocks noChangeAspect="1"/>
+          </p:cNvPicPr>
+          <p:nvPr/>
+        </p:nvPicPr>
+        <p:blipFill rotWithShape="1">
+          <a:blip r:embed="rId6">
+            <a:extLst>
+              <a:ext uri="{28A0092B-C50C-407E-A947-70E740481C1C}">
+                <a14:useLocalDpi xmlns:a14="http://schemas.microsoft.com/office/drawing/2010/main" val="0"/>
+              </a:ext>
+            </a:extLst>
+          </a:blip>
+          <a:srcRect b="21295"/>
+          <a:stretch/>
+        </p:blipFill>
+        <p:spPr>
+          <a:xfrm>
+            <a:off x="13078368" y="5053584"/>
+            <a:ext cx="4826000" cy="3798316"/>
+          </a:xfrm>
+          <a:prstGeom prst="rect">
+            <a:avLst/>
+          </a:prstGeom>
+        </p:spPr>
+      </p:pic>
+      <p:pic>
+        <p:nvPicPr>
+          <p:cNvPr id="7" name="Picture 6"/>
+          <p:cNvPicPr>
+            <a:picLocks noChangeAspect="1"/>
+          </p:cNvPicPr>
+          <p:nvPr/>
+        </p:nvPicPr>
+        <p:blipFill rotWithShape="1">
+          <a:blip r:embed="rId7">
+            <a:extLst>
+              <a:ext uri="{28A0092B-C50C-407E-A947-70E740481C1C}">
+                <a14:useLocalDpi xmlns:a14="http://schemas.microsoft.com/office/drawing/2010/main" val="0"/>
+              </a:ext>
+            </a:extLst>
+          </a:blip>
+          <a:srcRect b="20182"/>
+          <a:stretch/>
+        </p:blipFill>
+        <p:spPr>
+          <a:xfrm>
+            <a:off x="4099468" y="9398000"/>
+            <a:ext cx="9753600" cy="7785100"/>
+          </a:xfrm>
+          <a:prstGeom prst="rect">
+            <a:avLst/>
+          </a:prstGeom>
+        </p:spPr>
+      </p:pic>
     </p:spTree>
     <p:extLst>
       <p:ext uri="{BB962C8B-B14F-4D97-AF65-F5344CB8AC3E}">
@@ -3454,47 +4441,47 @@
 </file>
 
 <file path=ppt/theme/theme1.xml><?xml version="1.0" encoding="utf-8"?>
-<a:theme xmlns:a="http://schemas.openxmlformats.org/drawingml/2006/main" name="Office Theme">
+<a:theme xmlns:a="http://schemas.openxmlformats.org/drawingml/2006/main" name="Retrospect">
   <a:themeElements>
-    <a:clrScheme name="Office Theme">
+    <a:clrScheme name="Retrospect">
       <a:dk1>
-        <a:sysClr val="windowText" lastClr="000000"/>
+        <a:srgbClr val="000000"/>
       </a:dk1>
       <a:lt1>
         <a:sysClr val="window" lastClr="FFFFFF"/>
       </a:lt1>
       <a:dk2>
-        <a:srgbClr val="44546A"/>
+        <a:srgbClr val="637052"/>
       </a:dk2>
       <a:lt2>
-        <a:srgbClr val="E7E6E6"/>
+        <a:srgbClr val="CCDDEA"/>
       </a:lt2>
       <a:accent1>
-        <a:srgbClr val="5B9BD5"/>
+        <a:srgbClr val="E48312"/>
       </a:accent1>
       <a:accent2>
-        <a:srgbClr val="ED7D31"/>
+        <a:srgbClr val="BD582C"/>
       </a:accent2>
       <a:accent3>
-        <a:srgbClr val="A5A5A5"/>
+        <a:srgbClr val="865640"/>
       </a:accent3>
       <a:accent4>
-        <a:srgbClr val="FFC000"/>
+        <a:srgbClr val="9B8357"/>
       </a:accent4>
       <a:accent5>
-        <a:srgbClr val="4472C4"/>
+        <a:srgbClr val="C2BC80"/>
       </a:accent5>
       <a:accent6>
-        <a:srgbClr val="70AD47"/>
+        <a:srgbClr val="94A088"/>
       </a:accent6>
       <a:hlink>
-        <a:srgbClr val="0563C1"/>
+        <a:srgbClr val="2998E3"/>
       </a:hlink>
       <a:folHlink>
-        <a:srgbClr val="954F72"/>
+        <a:srgbClr val="8C8C8C"/>
       </a:folHlink>
     </a:clrScheme>
-    <a:fontScheme name="Office Theme">
+    <a:fontScheme name="Retrospect">
       <a:majorFont>
         <a:latin typeface="Calibri Light" panose="020F0302020204030204"/>
         <a:ea typeface=""/>
@@ -3566,7 +4553,7 @@
         <a:font script="Geor" typeface="Sylfaen"/>
       </a:minorFont>
     </a:fontScheme>
-    <a:fmtScheme name="Office Theme">
+    <a:fmtScheme name="Retrospect">
       <a:fillStyleLst>
         <a:solidFill>
           <a:schemeClr val="phClr"/>
@@ -3575,76 +4562,81 @@
           <a:gsLst>
             <a:gs pos="0">
               <a:schemeClr val="phClr">
-                <a:lumMod val="110000"/>
-                <a:satMod val="105000"/>
-                <a:tint val="67000"/>
+                <a:tint val="65000"/>
+                <a:shade val="92000"/>
+                <a:satMod val="130000"/>
               </a:schemeClr>
             </a:gs>
-            <a:gs pos="50000">
+            <a:gs pos="45000">
               <a:schemeClr val="phClr">
-                <a:lumMod val="105000"/>
-                <a:satMod val="103000"/>
-                <a:tint val="73000"/>
+                <a:tint val="60000"/>
+                <a:shade val="99000"/>
+                <a:satMod val="120000"/>
               </a:schemeClr>
             </a:gs>
             <a:gs pos="100000">
               <a:schemeClr val="phClr">
-                <a:lumMod val="105000"/>
-                <a:satMod val="109000"/>
-                <a:tint val="81000"/>
+                <a:tint val="55000"/>
+                <a:satMod val="140000"/>
               </a:schemeClr>
             </a:gs>
           </a:gsLst>
-          <a:lin ang="5400000" scaled="0"/>
+          <a:path path="circle">
+            <a:fillToRect l="100000" t="100000" r="100000" b="100000"/>
+          </a:path>
         </a:gradFill>
         <a:gradFill rotWithShape="1">
           <a:gsLst>
             <a:gs pos="0">
               <a:schemeClr val="phClr">
-                <a:satMod val="103000"/>
-                <a:lumMod val="102000"/>
-                <a:tint val="94000"/>
+                <a:shade val="85000"/>
+                <a:satMod val="130000"/>
               </a:schemeClr>
             </a:gs>
-            <a:gs pos="50000">
+            <a:gs pos="34000">
               <a:schemeClr val="phClr">
-                <a:satMod val="110000"/>
-                <a:lumMod val="100000"/>
-                <a:shade val="100000"/>
+                <a:shade val="87000"/>
+                <a:satMod val="125000"/>
+              </a:schemeClr>
+            </a:gs>
+            <a:gs pos="70000">
+              <a:schemeClr val="phClr">
+                <a:tint val="100000"/>
+                <a:shade val="90000"/>
+                <a:satMod val="130000"/>
               </a:schemeClr>
             </a:gs>
             <a:gs pos="100000">
               <a:schemeClr val="phClr">
-                <a:lumMod val="99000"/>
-                <a:satMod val="120000"/>
-                <a:shade val="78000"/>
+                <a:tint val="100000"/>
+                <a:shade val="100000"/>
+                <a:satMod val="110000"/>
               </a:schemeClr>
             </a:gs>
           </a:gsLst>
-          <a:lin ang="5400000" scaled="0"/>
+          <a:path path="circle">
+            <a:fillToRect l="100000" t="100000" r="100000" b="100000"/>
+          </a:path>
         </a:gradFill>
       </a:fillStyleLst>
       <a:lnStyleLst>
-        <a:ln w="6350" cap="flat" cmpd="sng" algn="ctr">
-          <a:solidFill>
-            <a:schemeClr val="phClr"/>
-          </a:solidFill>
-          <a:prstDash val="solid"/>
-          <a:miter lim="800000"/>
-        </a:ln>
         <a:ln w="12700" cap="flat" cmpd="sng" algn="ctr">
           <a:solidFill>
             <a:schemeClr val="phClr"/>
           </a:solidFill>
           <a:prstDash val="solid"/>
-          <a:miter lim="800000"/>
         </a:ln>
-        <a:ln w="19050" cap="flat" cmpd="sng" algn="ctr">
+        <a:ln w="15875" cap="flat" cmpd="sng" algn="ctr">
           <a:solidFill>
             <a:schemeClr val="phClr"/>
           </a:solidFill>
           <a:prstDash val="solid"/>
-          <a:miter lim="800000"/>
+        </a:ln>
+        <a:ln w="25400" cap="flat" cmpd="sng" algn="ctr">
+          <a:solidFill>
+            <a:schemeClr val="phClr"/>
+          </a:solidFill>
+          <a:prstDash val="solid"/>
         </a:ln>
       </a:lnStyleLst>
       <a:effectStyleLst>
@@ -3652,16 +4644,33 @@
           <a:effectLst/>
         </a:effectStyle>
         <a:effectStyle>
-          <a:effectLst/>
+          <a:effectLst>
+            <a:outerShdw blurRad="38100" dist="25400" dir="2700000" algn="br" rotWithShape="0">
+              <a:srgbClr val="000000">
+                <a:alpha val="60000"/>
+              </a:srgbClr>
+            </a:outerShdw>
+          </a:effectLst>
         </a:effectStyle>
         <a:effectStyle>
           <a:effectLst>
-            <a:outerShdw blurRad="57150" dist="19050" dir="5400000" algn="ctr" rotWithShape="0">
+            <a:outerShdw blurRad="44450" dist="25400" dir="2700000" algn="br" rotWithShape="0">
               <a:srgbClr val="000000">
-                <a:alpha val="63000"/>
+                <a:alpha val="60000"/>
               </a:srgbClr>
             </a:outerShdw>
           </a:effectLst>
+          <a:scene3d>
+            <a:camera prst="orthographicFront">
+              <a:rot lat="0" lon="0" rev="0"/>
+            </a:camera>
+            <a:lightRig rig="threePt" dir="t">
+              <a:rot lat="0" lon="0" rev="19800000"/>
+            </a:lightRig>
+          </a:scene3d>
+          <a:sp3d prstMaterial="flat">
+            <a:bevelT w="25400" h="31750"/>
+          </a:sp3d>
         </a:effectStyle>
       </a:effectStyleLst>
       <a:bgFillStyleLst>
@@ -3670,36 +4679,36 @@
         </a:solidFill>
         <a:solidFill>
           <a:schemeClr val="phClr">
-            <a:tint val="95000"/>
-            <a:satMod val="170000"/>
+            <a:tint val="90000"/>
+            <a:shade val="97000"/>
+            <a:satMod val="130000"/>
           </a:schemeClr>
         </a:solidFill>
         <a:gradFill rotWithShape="1">
           <a:gsLst>
             <a:gs pos="0">
               <a:schemeClr val="phClr">
-                <a:tint val="93000"/>
-                <a:satMod val="150000"/>
-                <a:shade val="98000"/>
-                <a:lumMod val="102000"/>
+                <a:tint val="96000"/>
+                <a:shade val="99000"/>
+                <a:satMod val="140000"/>
               </a:schemeClr>
             </a:gs>
-            <a:gs pos="50000">
+            <a:gs pos="65000">
               <a:schemeClr val="phClr">
-                <a:tint val="98000"/>
+                <a:tint val="100000"/>
+                <a:shade val="80000"/>
                 <a:satMod val="130000"/>
-                <a:shade val="90000"/>
-                <a:lumMod val="103000"/>
               </a:schemeClr>
             </a:gs>
             <a:gs pos="100000">
               <a:schemeClr val="phClr">
-                <a:shade val="63000"/>
+                <a:tint val="100000"/>
+                <a:shade val="48000"/>
                 <a:satMod val="120000"/>
               </a:schemeClr>
             </a:gs>
           </a:gsLst>
-          <a:lin ang="5400000" scaled="0"/>
+          <a:lin ang="16200000" scaled="0"/>
         </a:gradFill>
       </a:bgFillStyleLst>
     </a:fmtScheme>
@@ -3708,7 +4717,7 @@
   <a:extraClrSchemeLst/>
   <a:extLst>
     <a:ext uri="{05A4C25C-085E-4340-85A3-A5531E510DB2}">
-      <thm15:themeFamily xmlns:thm15="http://schemas.microsoft.com/office/thememl/2012/main" name="Office Theme" id="{62F939B6-93AF-4DB8-9C6B-D6C7DFDC589F}" vid="{4A3C46E8-61CC-4603-A589-7422A47A8E4A}"/>
+      <thm15:themeFamily xmlns:thm15="http://schemas.microsoft.com/office/thememl/2012/main" name="Retrospect" id="{5F128B03-DCCA-4EEB-AB3B-CF2899314A46}" vid="{3F1AAB62-24C6-49D2-8E01-B56FAC9A3DCD}"/>
     </a:ext>
   </a:extLst>
 </a:theme>

</xml_diff>